<commit_message>
place for software design summaries
</commit_message>
<xml_diff>
--- a/epsych_v2_design.pptx
+++ b/epsych_v2_design.pptx
@@ -913,8 +913,8 @@
           <a:pPr algn="ctr"/>
           <a:r>
             <a:rPr lang="en-US" sz="2000" b="0" dirty="0">
-              <a:latin typeface="Aharoni" panose="020B0604020202020204" pitchFamily="2" charset="-79"/>
-              <a:cs typeface="Aharoni" panose="020B0604020202020204" pitchFamily="2" charset="-79"/>
+              <a:latin typeface="Arial" panose="020B0604020202020204" pitchFamily="34" charset="0"/>
+              <a:cs typeface="Arial" panose="020B0604020202020204" pitchFamily="34" charset="0"/>
             </a:rPr>
             <a:t>RUNTIME</a:t>
           </a:r>
@@ -930,8 +930,8 @@
         <a:p>
           <a:pPr algn="ctr"/>
           <a:endParaRPr lang="en-US" sz="2000" b="0">
-            <a:latin typeface="Aharoni" panose="020B0604020202020204" pitchFamily="2" charset="-79"/>
-            <a:cs typeface="Aharoni" panose="020B0604020202020204" pitchFamily="2" charset="-79"/>
+            <a:latin typeface="Arial" panose="020B0604020202020204" pitchFamily="34" charset="0"/>
+            <a:cs typeface="Arial" panose="020B0604020202020204" pitchFamily="34" charset="0"/>
           </a:endParaRPr>
         </a:p>
       </dgm:t>
@@ -945,8 +945,8 @@
         <a:p>
           <a:pPr algn="ctr"/>
           <a:endParaRPr lang="en-US" sz="2000" b="0">
-            <a:latin typeface="Aharoni" panose="020B0604020202020204" pitchFamily="2" charset="-79"/>
-            <a:cs typeface="Aharoni" panose="020B0604020202020204" pitchFamily="2" charset="-79"/>
+            <a:latin typeface="Arial" panose="020B0604020202020204" pitchFamily="34" charset="0"/>
+            <a:cs typeface="Arial" panose="020B0604020202020204" pitchFamily="34" charset="0"/>
           </a:endParaRPr>
         </a:p>
       </dgm:t>
@@ -961,11 +961,35 @@
           <a:pPr algn="ctr"/>
           <a:r>
             <a:rPr lang="en-US" sz="2000" b="0" dirty="0">
-              <a:latin typeface="Aharoni" panose="020B0604020202020204" pitchFamily="2" charset="-79"/>
-              <a:cs typeface="Aharoni" panose="020B0604020202020204" pitchFamily="2" charset="-79"/>
+              <a:latin typeface="Arial" panose="020B0604020202020204" pitchFamily="34" charset="0"/>
+              <a:cs typeface="Arial" panose="020B0604020202020204" pitchFamily="34" charset="0"/>
             </a:rPr>
             <a:t>Subject</a:t>
           </a:r>
+        </a:p>
+        <a:p>
+          <a:pPr algn="ctr"/>
+          <a:r>
+            <a:rPr lang="en-US" sz="1200" b="0" dirty="0">
+              <a:latin typeface="Arial" panose="020B0604020202020204" pitchFamily="34" charset="0"/>
+              <a:cs typeface="Arial" panose="020B0604020202020204" pitchFamily="34" charset="0"/>
+            </a:rPr>
+            <a:t>Identifying &amp; descriptive information</a:t>
+          </a:r>
+        </a:p>
+        <a:p>
+          <a:pPr algn="ctr"/>
+          <a:r>
+            <a:rPr lang="en-US" sz="1200" b="0" dirty="0">
+              <a:latin typeface="Arial" panose="020B0604020202020204" pitchFamily="34" charset="0"/>
+              <a:cs typeface="Arial" panose="020B0604020202020204" pitchFamily="34" charset="0"/>
+            </a:rPr>
+            <a:t>Subject-specific protocols</a:t>
+          </a:r>
+          <a:endParaRPr lang="en-US" sz="2000" b="0" dirty="0">
+            <a:latin typeface="Arial" panose="020B0604020202020204" pitchFamily="34" charset="0"/>
+            <a:cs typeface="Arial" panose="020B0604020202020204" pitchFamily="34" charset="0"/>
+          </a:endParaRPr>
         </a:p>
       </dgm:t>
     </dgm:pt>
@@ -978,8 +1002,8 @@
         <a:p>
           <a:pPr algn="ctr"/>
           <a:endParaRPr lang="en-US" sz="2000" b="0">
-            <a:latin typeface="Aharoni" panose="020B0604020202020204" pitchFamily="2" charset="-79"/>
-            <a:cs typeface="Aharoni" panose="020B0604020202020204" pitchFamily="2" charset="-79"/>
+            <a:latin typeface="Arial" panose="020B0604020202020204" pitchFamily="34" charset="0"/>
+            <a:cs typeface="Arial" panose="020B0604020202020204" pitchFamily="34" charset="0"/>
           </a:endParaRPr>
         </a:p>
       </dgm:t>
@@ -993,8 +1017,8 @@
         <a:p>
           <a:pPr algn="ctr"/>
           <a:endParaRPr lang="en-US" sz="2000" b="0">
-            <a:latin typeface="Aharoni" panose="020B0604020202020204" pitchFamily="2" charset="-79"/>
-            <a:cs typeface="Aharoni" panose="020B0604020202020204" pitchFamily="2" charset="-79"/>
+            <a:latin typeface="Arial" panose="020B0604020202020204" pitchFamily="34" charset="0"/>
+            <a:cs typeface="Arial" panose="020B0604020202020204" pitchFamily="34" charset="0"/>
           </a:endParaRPr>
         </a:p>
       </dgm:t>
@@ -1009,10 +1033,20 @@
           <a:pPr algn="ctr"/>
           <a:r>
             <a:rPr lang="en-US" sz="2000" b="0" dirty="0">
-              <a:latin typeface="Aharoni" panose="020B0604020202020204" pitchFamily="2" charset="-79"/>
-              <a:cs typeface="Aharoni" panose="020B0604020202020204" pitchFamily="2" charset="-79"/>
+              <a:latin typeface="Arial" panose="020B0604020202020204" pitchFamily="34" charset="0"/>
+              <a:cs typeface="Arial" panose="020B0604020202020204" pitchFamily="34" charset="0"/>
             </a:rPr>
             <a:t>Hardware</a:t>
+          </a:r>
+        </a:p>
+        <a:p>
+          <a:pPr algn="ctr"/>
+          <a:r>
+            <a:rPr lang="en-US" sz="1200" b="0" dirty="0">
+              <a:latin typeface="Arial" panose="020B0604020202020204" pitchFamily="34" charset="0"/>
+              <a:cs typeface="Arial" panose="020B0604020202020204" pitchFamily="34" charset="0"/>
+            </a:rPr>
+            <a:t>Abstraction layer</a:t>
           </a:r>
         </a:p>
       </dgm:t>
@@ -1026,8 +1060,8 @@
         <a:p>
           <a:pPr algn="ctr"/>
           <a:endParaRPr lang="en-US" sz="2000" b="0">
-            <a:latin typeface="Aharoni" panose="020B0604020202020204" pitchFamily="2" charset="-79"/>
-            <a:cs typeface="Aharoni" panose="020B0604020202020204" pitchFamily="2" charset="-79"/>
+            <a:latin typeface="Arial" panose="020B0604020202020204" pitchFamily="34" charset="0"/>
+            <a:cs typeface="Arial" panose="020B0604020202020204" pitchFamily="34" charset="0"/>
           </a:endParaRPr>
         </a:p>
       </dgm:t>
@@ -1041,8 +1075,8 @@
         <a:p>
           <a:pPr algn="ctr"/>
           <a:endParaRPr lang="en-US" sz="2000" b="0">
-            <a:latin typeface="Aharoni" panose="020B0604020202020204" pitchFamily="2" charset="-79"/>
-            <a:cs typeface="Aharoni" panose="020B0604020202020204" pitchFamily="2" charset="-79"/>
+            <a:latin typeface="Arial" panose="020B0604020202020204" pitchFamily="34" charset="0"/>
+            <a:cs typeface="Arial" panose="020B0604020202020204" pitchFamily="34" charset="0"/>
           </a:endParaRPr>
         </a:p>
       </dgm:t>
@@ -1056,11 +1090,25 @@
         <a:p>
           <a:pPr algn="ctr"/>
           <a:r>
-            <a:rPr lang="en-US" sz="2000" b="0" dirty="0">
-              <a:latin typeface="Aharoni" panose="020B0604020202020204" pitchFamily="2" charset="-79"/>
-              <a:cs typeface="Aharoni" panose="020B0604020202020204" pitchFamily="2" charset="-79"/>
+            <a:rPr lang="en-US" sz="2000" b="0" dirty="0" err="1">
+              <a:latin typeface="Arial" panose="020B0604020202020204" pitchFamily="34" charset="0"/>
+              <a:cs typeface="Arial" panose="020B0604020202020204" pitchFamily="34" charset="0"/>
             </a:rPr>
-            <a:t>Config</a:t>
+            <a:t>RuntimeConfig</a:t>
+          </a:r>
+          <a:endParaRPr lang="en-US" sz="2000" b="0" dirty="0">
+            <a:latin typeface="Arial" panose="020B0604020202020204" pitchFamily="34" charset="0"/>
+            <a:cs typeface="Arial" panose="020B0604020202020204" pitchFamily="34" charset="0"/>
+          </a:endParaRPr>
+        </a:p>
+        <a:p>
+          <a:pPr algn="ctr"/>
+          <a:r>
+            <a:rPr lang="en-US" sz="1200" b="0" dirty="0">
+              <a:latin typeface="Arial" panose="020B0604020202020204" pitchFamily="34" charset="0"/>
+              <a:cs typeface="Arial" panose="020B0604020202020204" pitchFamily="34" charset="0"/>
+            </a:rPr>
+            <a:t>User customizations</a:t>
           </a:r>
         </a:p>
       </dgm:t>
@@ -1074,8 +1122,8 @@
         <a:p>
           <a:pPr algn="ctr"/>
           <a:endParaRPr lang="en-US" sz="2000" b="0">
-            <a:latin typeface="Aharoni" panose="020B0604020202020204" pitchFamily="2" charset="-79"/>
-            <a:cs typeface="Aharoni" panose="020B0604020202020204" pitchFamily="2" charset="-79"/>
+            <a:latin typeface="Arial" panose="020B0604020202020204" pitchFamily="34" charset="0"/>
+            <a:cs typeface="Arial" panose="020B0604020202020204" pitchFamily="34" charset="0"/>
           </a:endParaRPr>
         </a:p>
       </dgm:t>
@@ -1089,8 +1137,8 @@
         <a:p>
           <a:pPr algn="ctr"/>
           <a:endParaRPr lang="en-US" sz="2000" b="0">
-            <a:latin typeface="Aharoni" panose="020B0604020202020204" pitchFamily="2" charset="-79"/>
-            <a:cs typeface="Aharoni" panose="020B0604020202020204" pitchFamily="2" charset="-79"/>
+            <a:latin typeface="Arial" panose="020B0604020202020204" pitchFamily="34" charset="0"/>
+            <a:cs typeface="Arial" panose="020B0604020202020204" pitchFamily="34" charset="0"/>
           </a:endParaRPr>
         </a:p>
       </dgm:t>
@@ -1104,15 +1152,15 @@
         <a:p>
           <a:pPr algn="ctr"/>
           <a:r>
-            <a:rPr lang="en-US" sz="2000" b="0">
-              <a:latin typeface="Aharoni" panose="020B0604020202020204" pitchFamily="2" charset="-79"/>
-              <a:cs typeface="Aharoni" panose="020B0604020202020204" pitchFamily="2" charset="-79"/>
+            <a:rPr lang="en-US" sz="2000" b="0" dirty="0" err="1">
+              <a:latin typeface="Arial" panose="020B0604020202020204" pitchFamily="34" charset="0"/>
+              <a:cs typeface="Arial" panose="020B0604020202020204" pitchFamily="34" charset="0"/>
             </a:rPr>
             <a:t>TDTActiveX</a:t>
           </a:r>
           <a:endParaRPr lang="en-US" sz="2000" b="0" dirty="0">
-            <a:latin typeface="Aharoni" panose="020B0604020202020204" pitchFamily="2" charset="-79"/>
-            <a:cs typeface="Aharoni" panose="020B0604020202020204" pitchFamily="2" charset="-79"/>
+            <a:latin typeface="Arial" panose="020B0604020202020204" pitchFamily="34" charset="0"/>
+            <a:cs typeface="Arial" panose="020B0604020202020204" pitchFamily="34" charset="0"/>
           </a:endParaRPr>
         </a:p>
       </dgm:t>
@@ -1130,8 +1178,8 @@
         <a:p>
           <a:pPr algn="ctr"/>
           <a:endParaRPr lang="en-US" sz="2000" b="0">
-            <a:latin typeface="Aharoni" panose="020B0604020202020204" pitchFamily="2" charset="-79"/>
-            <a:cs typeface="Aharoni" panose="020B0604020202020204" pitchFamily="2" charset="-79"/>
+            <a:latin typeface="Arial" panose="020B0604020202020204" pitchFamily="34" charset="0"/>
+            <a:cs typeface="Arial" panose="020B0604020202020204" pitchFamily="34" charset="0"/>
           </a:endParaRPr>
         </a:p>
       </dgm:t>
@@ -1145,8 +1193,8 @@
         <a:p>
           <a:pPr algn="ctr"/>
           <a:endParaRPr lang="en-US" sz="2000" b="0">
-            <a:latin typeface="Aharoni" panose="020B0604020202020204" pitchFamily="2" charset="-79"/>
-            <a:cs typeface="Aharoni" panose="020B0604020202020204" pitchFamily="2" charset="-79"/>
+            <a:latin typeface="Arial" panose="020B0604020202020204" pitchFamily="34" charset="0"/>
+            <a:cs typeface="Arial" panose="020B0604020202020204" pitchFamily="34" charset="0"/>
           </a:endParaRPr>
         </a:p>
       </dgm:t>
@@ -1161,14 +1209,14 @@
           <a:pPr algn="ctr"/>
           <a:r>
             <a:rPr lang="en-US" sz="2000" b="0" dirty="0" err="1">
-              <a:latin typeface="Aharoni" panose="020B0604020202020204" pitchFamily="2" charset="-79"/>
-              <a:cs typeface="Aharoni" panose="020B0604020202020204" pitchFamily="2" charset="-79"/>
+              <a:latin typeface="Arial" panose="020B0604020202020204" pitchFamily="34" charset="0"/>
+              <a:cs typeface="Arial" panose="020B0604020202020204" pitchFamily="34" charset="0"/>
             </a:rPr>
             <a:t>TDTSynapse</a:t>
           </a:r>
           <a:endParaRPr lang="en-US" sz="2000" b="0" dirty="0">
-            <a:latin typeface="Aharoni" panose="020B0604020202020204" pitchFamily="2" charset="-79"/>
-            <a:cs typeface="Aharoni" panose="020B0604020202020204" pitchFamily="2" charset="-79"/>
+            <a:latin typeface="Arial" panose="020B0604020202020204" pitchFamily="34" charset="0"/>
+            <a:cs typeface="Arial" panose="020B0604020202020204" pitchFamily="34" charset="0"/>
           </a:endParaRPr>
         </a:p>
       </dgm:t>
@@ -1186,8 +1234,8 @@
         <a:p>
           <a:pPr algn="ctr"/>
           <a:endParaRPr lang="en-US" sz="2000" b="0">
-            <a:latin typeface="Aharoni" panose="020B0604020202020204" pitchFamily="2" charset="-79"/>
-            <a:cs typeface="Aharoni" panose="020B0604020202020204" pitchFamily="2" charset="-79"/>
+            <a:latin typeface="Arial" panose="020B0604020202020204" pitchFamily="34" charset="0"/>
+            <a:cs typeface="Arial" panose="020B0604020202020204" pitchFamily="34" charset="0"/>
           </a:endParaRPr>
         </a:p>
       </dgm:t>
@@ -1201,8 +1249,8 @@
         <a:p>
           <a:pPr algn="ctr"/>
           <a:endParaRPr lang="en-US" sz="2000" b="0">
-            <a:latin typeface="Aharoni" panose="020B0604020202020204" pitchFamily="2" charset="-79"/>
-            <a:cs typeface="Aharoni" panose="020B0604020202020204" pitchFamily="2" charset="-79"/>
+            <a:latin typeface="Arial" panose="020B0604020202020204" pitchFamily="34" charset="0"/>
+            <a:cs typeface="Arial" panose="020B0604020202020204" pitchFamily="34" charset="0"/>
           </a:endParaRPr>
         </a:p>
       </dgm:t>
@@ -1217,14 +1265,14 @@
           <a:pPr algn="ctr"/>
           <a:r>
             <a:rPr lang="en-US" sz="2000" b="0" dirty="0" err="1">
-              <a:latin typeface="Aharoni" panose="020B0604020202020204" pitchFamily="2" charset="-79"/>
-              <a:cs typeface="Aharoni" panose="020B0604020202020204" pitchFamily="2" charset="-79"/>
+              <a:latin typeface="Arial" panose="020B0604020202020204" pitchFamily="34" charset="0"/>
+              <a:cs typeface="Arial" panose="020B0604020202020204" pitchFamily="34" charset="0"/>
             </a:rPr>
             <a:t>NationalInstruments</a:t>
           </a:r>
           <a:endParaRPr lang="en-US" sz="2000" b="0" dirty="0">
-            <a:latin typeface="Aharoni" panose="020B0604020202020204" pitchFamily="2" charset="-79"/>
-            <a:cs typeface="Aharoni" panose="020B0604020202020204" pitchFamily="2" charset="-79"/>
+            <a:latin typeface="Arial" panose="020B0604020202020204" pitchFamily="34" charset="0"/>
+            <a:cs typeface="Arial" panose="020B0604020202020204" pitchFamily="34" charset="0"/>
           </a:endParaRPr>
         </a:p>
       </dgm:t>
@@ -1242,8 +1290,8 @@
         <a:p>
           <a:pPr algn="ctr"/>
           <a:endParaRPr lang="en-US" sz="2000" b="0">
-            <a:latin typeface="Aharoni" panose="020B0604020202020204" pitchFamily="2" charset="-79"/>
-            <a:cs typeface="Aharoni" panose="020B0604020202020204" pitchFamily="2" charset="-79"/>
+            <a:latin typeface="Arial" panose="020B0604020202020204" pitchFamily="34" charset="0"/>
+            <a:cs typeface="Arial" panose="020B0604020202020204" pitchFamily="34" charset="0"/>
           </a:endParaRPr>
         </a:p>
       </dgm:t>
@@ -1257,8 +1305,8 @@
         <a:p>
           <a:pPr algn="ctr"/>
           <a:endParaRPr lang="en-US" sz="2000" b="0">
-            <a:latin typeface="Aharoni" panose="020B0604020202020204" pitchFamily="2" charset="-79"/>
-            <a:cs typeface="Aharoni" panose="020B0604020202020204" pitchFamily="2" charset="-79"/>
+            <a:latin typeface="Arial" panose="020B0604020202020204" pitchFamily="34" charset="0"/>
+            <a:cs typeface="Arial" panose="020B0604020202020204" pitchFamily="34" charset="0"/>
           </a:endParaRPr>
         </a:p>
       </dgm:t>
@@ -1273,8 +1321,8 @@
           <a:pPr algn="ctr"/>
           <a:r>
             <a:rPr lang="en-US" sz="2000" b="0" dirty="0">
-              <a:latin typeface="Aharoni" panose="020B0604020202020204" pitchFamily="2" charset="-79"/>
-              <a:cs typeface="Aharoni" panose="020B0604020202020204" pitchFamily="2" charset="-79"/>
+              <a:latin typeface="Arial" panose="020B0604020202020204" pitchFamily="34" charset="0"/>
+              <a:cs typeface="Arial" panose="020B0604020202020204" pitchFamily="34" charset="0"/>
             </a:rPr>
             <a:t>Some new system interface…</a:t>
           </a:r>
@@ -1294,8 +1342,8 @@
         <a:p>
           <a:pPr algn="ctr"/>
           <a:endParaRPr lang="en-US" sz="2000" b="0">
-            <a:latin typeface="Aharoni" panose="020B0604020202020204" pitchFamily="2" charset="-79"/>
-            <a:cs typeface="Aharoni" panose="020B0604020202020204" pitchFamily="2" charset="-79"/>
+            <a:latin typeface="Arial" panose="020B0604020202020204" pitchFamily="34" charset="0"/>
+            <a:cs typeface="Arial" panose="020B0604020202020204" pitchFamily="34" charset="0"/>
           </a:endParaRPr>
         </a:p>
       </dgm:t>
@@ -1309,8 +1357,8 @@
         <a:p>
           <a:pPr algn="ctr"/>
           <a:endParaRPr lang="en-US" sz="2000" b="0">
-            <a:latin typeface="Aharoni" panose="020B0604020202020204" pitchFamily="2" charset="-79"/>
-            <a:cs typeface="Aharoni" panose="020B0604020202020204" pitchFamily="2" charset="-79"/>
+            <a:latin typeface="Arial" panose="020B0604020202020204" pitchFamily="34" charset="0"/>
+            <a:cs typeface="Arial" panose="020B0604020202020204" pitchFamily="34" charset="0"/>
           </a:endParaRPr>
         </a:p>
       </dgm:t>
@@ -1343,12 +1391,36 @@
       <dgm:prSet presAssocID="{92F16719-4314-4855-9060-5929ED43F413}" presName="level2hierChild" presStyleCnt="0"/>
       <dgm:spPr/>
     </dgm:pt>
+    <dgm:pt modelId="{452CAEC8-30FA-4E4A-A0CD-B145BF3AF42F}" type="pres">
+      <dgm:prSet presAssocID="{D00E739B-1489-4748-BCE8-C6F5BD364405}" presName="conn2-1" presStyleLbl="parChTrans1D2" presStyleIdx="0" presStyleCnt="3"/>
+      <dgm:spPr/>
+    </dgm:pt>
+    <dgm:pt modelId="{71A76CF3-AD04-4A62-A6F8-547099891DBE}" type="pres">
+      <dgm:prSet presAssocID="{D00E739B-1489-4748-BCE8-C6F5BD364405}" presName="connTx" presStyleLbl="parChTrans1D2" presStyleIdx="0" presStyleCnt="3"/>
+      <dgm:spPr/>
+    </dgm:pt>
+    <dgm:pt modelId="{648FD88E-1A7E-4AFB-8C7C-3AB3C527BB57}" type="pres">
+      <dgm:prSet presAssocID="{B81E2989-389E-4FCB-A58E-4C131C569AB8}" presName="root2" presStyleCnt="0"/>
+      <dgm:spPr/>
+    </dgm:pt>
+    <dgm:pt modelId="{8BFE763E-1F61-43EB-86C6-6758D7B275C0}" type="pres">
+      <dgm:prSet presAssocID="{B81E2989-389E-4FCB-A58E-4C131C569AB8}" presName="LevelTwoTextNode" presStyleLbl="node2" presStyleIdx="0" presStyleCnt="2">
+        <dgm:presLayoutVars>
+          <dgm:chPref val="3"/>
+        </dgm:presLayoutVars>
+      </dgm:prSet>
+      <dgm:spPr/>
+    </dgm:pt>
+    <dgm:pt modelId="{F74EABC8-8330-4BE5-985E-DFADAD390910}" type="pres">
+      <dgm:prSet presAssocID="{B81E2989-389E-4FCB-A58E-4C131C569AB8}" presName="level3hierChild" presStyleCnt="0"/>
+      <dgm:spPr/>
+    </dgm:pt>
     <dgm:pt modelId="{8F8123F4-E80D-407E-B824-28C40A5675FD}" type="pres">
-      <dgm:prSet presAssocID="{AE6F42EE-05BA-404B-9EB9-6795E6693D09}" presName="conn2-1" presStyleLbl="parChTrans1D2" presStyleIdx="0" presStyleCnt="3"/>
+      <dgm:prSet presAssocID="{AE6F42EE-05BA-404B-9EB9-6795E6693D09}" presName="conn2-1" presStyleLbl="parChTrans1D2" presStyleIdx="1" presStyleCnt="3"/>
       <dgm:spPr/>
     </dgm:pt>
     <dgm:pt modelId="{000A9F72-345C-4272-9599-355C5BF14E00}" type="pres">
-      <dgm:prSet presAssocID="{AE6F42EE-05BA-404B-9EB9-6795E6693D09}" presName="connTx" presStyleLbl="parChTrans1D2" presStyleIdx="0" presStyleCnt="3"/>
+      <dgm:prSet presAssocID="{AE6F42EE-05BA-404B-9EB9-6795E6693D09}" presName="connTx" presStyleLbl="parChTrans1D2" presStyleIdx="1" presStyleCnt="3"/>
       <dgm:spPr/>
     </dgm:pt>
     <dgm:pt modelId="{409554E5-22E2-45D9-AB39-8E38CD3905E8}" type="pres">
@@ -1368,11 +1440,11 @@
       <dgm:spPr/>
     </dgm:pt>
     <dgm:pt modelId="{34D9AAE3-5725-4E9F-BDDB-DEB9447AD4B3}" type="pres">
-      <dgm:prSet presAssocID="{58C21C66-1A24-49F9-9269-1FAE2381270D}" presName="conn2-1" presStyleLbl="parChTrans1D2" presStyleIdx="1" presStyleCnt="3"/>
+      <dgm:prSet presAssocID="{58C21C66-1A24-49F9-9269-1FAE2381270D}" presName="conn2-1" presStyleLbl="parChTrans1D2" presStyleIdx="2" presStyleCnt="3"/>
       <dgm:spPr/>
     </dgm:pt>
     <dgm:pt modelId="{0208604E-140B-40D2-A7E8-09F6F94BB223}" type="pres">
-      <dgm:prSet presAssocID="{58C21C66-1A24-49F9-9269-1FAE2381270D}" presName="connTx" presStyleLbl="parChTrans1D2" presStyleIdx="1" presStyleCnt="3"/>
+      <dgm:prSet presAssocID="{58C21C66-1A24-49F9-9269-1FAE2381270D}" presName="connTx" presStyleLbl="parChTrans1D2" presStyleIdx="2" presStyleCnt="3"/>
       <dgm:spPr/>
     </dgm:pt>
     <dgm:pt modelId="{2C359AD2-22D1-414E-AA84-7DED84EDFCBA}" type="pres">
@@ -1380,7 +1452,7 @@
       <dgm:spPr/>
     </dgm:pt>
     <dgm:pt modelId="{23C82D94-A270-4AB9-8A2D-D31F996A4AF1}" type="pres">
-      <dgm:prSet presAssocID="{D114562E-C9BE-49CB-A279-37874B8BFB98}" presName="LevelTwoTextNode" presStyleLbl="node2" presStyleIdx="0" presStyleCnt="2">
+      <dgm:prSet presAssocID="{D114562E-C9BE-49CB-A279-37874B8BFB98}" presName="LevelTwoTextNode" presStyleLbl="node2" presStyleIdx="1" presStyleCnt="2">
         <dgm:presLayoutVars>
           <dgm:chPref val="3"/>
         </dgm:presLayoutVars>
@@ -1487,101 +1559,77 @@
       <dgm:prSet presAssocID="{AB26AC4C-94D8-4E12-8FD2-335821A03BDC}" presName="level3hierChild" presStyleCnt="0"/>
       <dgm:spPr/>
     </dgm:pt>
-    <dgm:pt modelId="{452CAEC8-30FA-4E4A-A0CD-B145BF3AF42F}" type="pres">
-      <dgm:prSet presAssocID="{D00E739B-1489-4748-BCE8-C6F5BD364405}" presName="conn2-1" presStyleLbl="parChTrans1D2" presStyleIdx="2" presStyleCnt="3"/>
-      <dgm:spPr/>
-    </dgm:pt>
-    <dgm:pt modelId="{71A76CF3-AD04-4A62-A6F8-547099891DBE}" type="pres">
-      <dgm:prSet presAssocID="{D00E739B-1489-4748-BCE8-C6F5BD364405}" presName="connTx" presStyleLbl="parChTrans1D2" presStyleIdx="2" presStyleCnt="3"/>
-      <dgm:spPr/>
-    </dgm:pt>
-    <dgm:pt modelId="{648FD88E-1A7E-4AFB-8C7C-3AB3C527BB57}" type="pres">
-      <dgm:prSet presAssocID="{B81E2989-389E-4FCB-A58E-4C131C569AB8}" presName="root2" presStyleCnt="0"/>
-      <dgm:spPr/>
-    </dgm:pt>
-    <dgm:pt modelId="{8BFE763E-1F61-43EB-86C6-6758D7B275C0}" type="pres">
-      <dgm:prSet presAssocID="{B81E2989-389E-4FCB-A58E-4C131C569AB8}" presName="LevelTwoTextNode" presStyleLbl="node2" presStyleIdx="1" presStyleCnt="2">
-        <dgm:presLayoutVars>
-          <dgm:chPref val="3"/>
-        </dgm:presLayoutVars>
-      </dgm:prSet>
-      <dgm:spPr/>
-    </dgm:pt>
-    <dgm:pt modelId="{F74EABC8-8330-4BE5-985E-DFADAD390910}" type="pres">
-      <dgm:prSet presAssocID="{B81E2989-389E-4FCB-A58E-4C131C569AB8}" presName="level3hierChild" presStyleCnt="0"/>
-      <dgm:spPr/>
-    </dgm:pt>
   </dgm:ptLst>
   <dgm:cxnLst>
-    <dgm:cxn modelId="{F622B50B-1A32-40B5-A070-DAC803961B5A}" type="presOf" srcId="{0A665E6E-7693-4B4D-957C-8DB1D6E77D6A}" destId="{C63E3B85-DB6F-4358-AD04-C7E79D27D0F9}" srcOrd="0" destOrd="0" presId="urn:microsoft.com/office/officeart/2008/layout/HorizontalMultiLevelHierarchy"/>
-    <dgm:cxn modelId="{699FFC0C-7423-4534-8AF4-53F520764D56}" type="presOf" srcId="{5C3EDCDC-DF4C-4B63-8217-2313688AFDDB}" destId="{5919FB03-1F63-4400-A1AD-748A7B57E0A6}" srcOrd="1" destOrd="0" presId="urn:microsoft.com/office/officeart/2008/layout/HorizontalMultiLevelHierarchy"/>
-    <dgm:cxn modelId="{4E72F20F-5367-4758-B26A-AAF01CD05AFD}" type="presOf" srcId="{D114562E-C9BE-49CB-A279-37874B8BFB98}" destId="{23C82D94-A270-4AB9-8A2D-D31F996A4AF1}" srcOrd="0" destOrd="0" presId="urn:microsoft.com/office/officeart/2008/layout/HorizontalMultiLevelHierarchy"/>
     <dgm:cxn modelId="{BDA78710-EDDB-4EE5-B6A5-1242F2572039}" srcId="{D114562E-C9BE-49CB-A279-37874B8BFB98}" destId="{AB26AC4C-94D8-4E12-8FD2-335821A03BDC}" srcOrd="3" destOrd="0" parTransId="{5C3EDCDC-DF4C-4B63-8217-2313688AFDDB}" sibTransId="{05202101-939C-4639-A60A-6A91AEF27C2A}"/>
-    <dgm:cxn modelId="{D06BC616-D391-4F5B-8E23-31DABA49BD70}" type="presOf" srcId="{BB07FD72-BBD0-4A83-A33E-C314DF094299}" destId="{576BC15B-169B-4BA9-BA1B-CA768D797C57}" srcOrd="0" destOrd="0" presId="urn:microsoft.com/office/officeart/2008/layout/HorizontalMultiLevelHierarchy"/>
-    <dgm:cxn modelId="{F32AEA17-6CF7-4A10-AEFF-DEA1DDD4CDBC}" type="presOf" srcId="{AE6F42EE-05BA-404B-9EB9-6795E6693D09}" destId="{8F8123F4-E80D-407E-B824-28C40A5675FD}" srcOrd="0" destOrd="0" presId="urn:microsoft.com/office/officeart/2008/layout/HorizontalMultiLevelHierarchy"/>
-    <dgm:cxn modelId="{C875942F-69C8-4985-9C20-8C3B4F9F01EC}" type="presOf" srcId="{58C21C66-1A24-49F9-9269-1FAE2381270D}" destId="{34D9AAE3-5725-4E9F-BDDB-DEB9447AD4B3}" srcOrd="0" destOrd="0" presId="urn:microsoft.com/office/officeart/2008/layout/HorizontalMultiLevelHierarchy"/>
-    <dgm:cxn modelId="{6351D235-B8A5-450B-A4D0-B80558D18AF9}" type="presOf" srcId="{D00E739B-1489-4748-BCE8-C6F5BD364405}" destId="{71A76CF3-AD04-4A62-A6F8-547099891DBE}" srcOrd="1" destOrd="0" presId="urn:microsoft.com/office/officeart/2008/layout/HorizontalMultiLevelHierarchy"/>
+    <dgm:cxn modelId="{320F2A1E-3FD8-4005-8379-F233F4D68D7F}" type="presOf" srcId="{92F16719-4314-4855-9060-5929ED43F413}" destId="{62D217EF-F3EF-442A-9728-0F6250A80547}" srcOrd="0" destOrd="0" presId="urn:microsoft.com/office/officeart/2008/layout/HorizontalMultiLevelHierarchy"/>
+    <dgm:cxn modelId="{E1EE4F2C-0CFD-4BAA-B226-6197151CDFCF}" type="presOf" srcId="{B81E2989-389E-4FCB-A58E-4C131C569AB8}" destId="{8BFE763E-1F61-43EB-86C6-6758D7B275C0}" srcOrd="0" destOrd="0" presId="urn:microsoft.com/office/officeart/2008/layout/HorizontalMultiLevelHierarchy"/>
+    <dgm:cxn modelId="{7FC8912F-BB57-4C41-9C14-ACB1CF3FD976}" type="presOf" srcId="{D00E739B-1489-4748-BCE8-C6F5BD364405}" destId="{71A76CF3-AD04-4A62-A6F8-547099891DBE}" srcOrd="1" destOrd="0" presId="urn:microsoft.com/office/officeart/2008/layout/HorizontalMultiLevelHierarchy"/>
+    <dgm:cxn modelId="{ECB1A239-2A81-419D-B498-CC6472465C2A}" type="presOf" srcId="{58C21C66-1A24-49F9-9269-1FAE2381270D}" destId="{0208604E-140B-40D2-A7E8-09F6F94BB223}" srcOrd="1" destOrd="0" presId="urn:microsoft.com/office/officeart/2008/layout/HorizontalMultiLevelHierarchy"/>
+    <dgm:cxn modelId="{A9B2B539-3F7B-460B-A347-B2FA51129246}" type="presOf" srcId="{A2045D68-1DD4-4AD0-999F-7EBB27022E91}" destId="{46EA138D-EC26-4575-8A60-6B619CF0FFA4}" srcOrd="0" destOrd="0" presId="urn:microsoft.com/office/officeart/2008/layout/HorizontalMultiLevelHierarchy"/>
     <dgm:cxn modelId="{2BAC505B-A8C3-46C7-BE2C-32B0F0043ACB}" srcId="{D114562E-C9BE-49CB-A279-37874B8BFB98}" destId="{0A665E6E-7693-4B4D-957C-8DB1D6E77D6A}" srcOrd="0" destOrd="0" parTransId="{3915E3B0-E90D-4145-A77A-8AC6F1A9DF88}" sibTransId="{D8C562D7-8C2D-47F2-ABE7-BA9DAA0D8EF9}"/>
-    <dgm:cxn modelId="{FF88BF4D-4CC4-4216-A216-30B7EFC94C9B}" type="presOf" srcId="{A2045D68-1DD4-4AD0-999F-7EBB27022E91}" destId="{46EA138D-EC26-4575-8A60-6B619CF0FFA4}" srcOrd="0" destOrd="0" presId="urn:microsoft.com/office/officeart/2008/layout/HorizontalMultiLevelHierarchy"/>
+    <dgm:cxn modelId="{ED7F1F60-3A39-45EF-94CF-79F4FF6A80FD}" type="presOf" srcId="{AE6F42EE-05BA-404B-9EB9-6795E6693D09}" destId="{000A9F72-345C-4272-9599-355C5BF14E00}" srcOrd="1" destOrd="0" presId="urn:microsoft.com/office/officeart/2008/layout/HorizontalMultiLevelHierarchy"/>
+    <dgm:cxn modelId="{C9891E46-215D-4717-BB64-21718CC5C79C}" type="presOf" srcId="{2C683329-F021-46C4-873A-4A90024F5824}" destId="{8B1D37C4-BE69-4E8F-8073-932B19B29946}" srcOrd="0" destOrd="0" presId="urn:microsoft.com/office/officeart/2008/layout/HorizontalMultiLevelHierarchy"/>
+    <dgm:cxn modelId="{8DBC806A-B548-4333-8F83-95F05E59C70B}" type="presOf" srcId="{2C683329-F021-46C4-873A-4A90024F5824}" destId="{4097D33A-C689-4E08-A5EE-335DF88C37F6}" srcOrd="1" destOrd="0" presId="urn:microsoft.com/office/officeart/2008/layout/HorizontalMultiLevelHierarchy"/>
     <dgm:cxn modelId="{9D3AC150-F820-430F-A5E6-2B774B8C91B6}" srcId="{9AE20638-A7AF-496D-93A6-0B5E3373B0B1}" destId="{92F16719-4314-4855-9060-5929ED43F413}" srcOrd="0" destOrd="0" parTransId="{3B59925F-D550-4509-B76D-9D5C34070B2D}" sibTransId="{1ED1B468-4ADC-40EF-AA45-4B3993F13981}"/>
     <dgm:cxn modelId="{3244DC71-1057-4733-88A5-B61B8B910CE1}" type="presOf" srcId="{9AE20638-A7AF-496D-93A6-0B5E3373B0B1}" destId="{FA891ABF-C99F-4A23-A210-2A4F0440584A}" srcOrd="0" destOrd="0" presId="urn:microsoft.com/office/officeart/2008/layout/HorizontalMultiLevelHierarchy"/>
-    <dgm:cxn modelId="{3C206C7A-9D24-4F61-A751-7377E9519F47}" type="presOf" srcId="{2C683329-F021-46C4-873A-4A90024F5824}" destId="{8B1D37C4-BE69-4E8F-8073-932B19B29946}" srcOrd="0" destOrd="0" presId="urn:microsoft.com/office/officeart/2008/layout/HorizontalMultiLevelHierarchy"/>
-    <dgm:cxn modelId="{DFA4CF7C-388C-4110-A730-732FDE93FD02}" type="presOf" srcId="{99FBDE0D-32AD-451E-A36F-39F6040D8BC0}" destId="{599E43A8-1BED-49D5-BE29-4DA6FD83C36B}" srcOrd="0" destOrd="0" presId="urn:microsoft.com/office/officeart/2008/layout/HorizontalMultiLevelHierarchy"/>
-    <dgm:cxn modelId="{7522DB82-E82C-4332-97B5-184DAAB3A51A}" type="presOf" srcId="{92F16719-4314-4855-9060-5929ED43F413}" destId="{62D217EF-F3EF-442A-9728-0F6250A80547}" srcOrd="0" destOrd="0" presId="urn:microsoft.com/office/officeart/2008/layout/HorizontalMultiLevelHierarchy"/>
-    <dgm:cxn modelId="{53043885-A5D8-4458-BC80-920E7C20ACEC}" type="presOf" srcId="{3915E3B0-E90D-4145-A77A-8AC6F1A9DF88}" destId="{37469FC6-F97C-4564-BD28-5FB6D4A4424E}" srcOrd="1" destOrd="0" presId="urn:microsoft.com/office/officeart/2008/layout/HorizontalMultiLevelHierarchy"/>
+    <dgm:cxn modelId="{69F5BE73-5034-4899-B784-F947AC14E41E}" type="presOf" srcId="{AB26AC4C-94D8-4E12-8FD2-335821A03BDC}" destId="{8D515895-ACF2-4C34-9E6A-146C8645314E}" srcOrd="0" destOrd="0" presId="urn:microsoft.com/office/officeart/2008/layout/HorizontalMultiLevelHierarchy"/>
     <dgm:cxn modelId="{5142D18F-A5E8-4845-8E55-D54B7A84A722}" srcId="{D114562E-C9BE-49CB-A279-37874B8BFB98}" destId="{99FBDE0D-32AD-451E-A36F-39F6040D8BC0}" srcOrd="2" destOrd="0" parTransId="{2C683329-F021-46C4-873A-4A90024F5824}" sibTransId="{42B81935-3677-45AA-9416-1517CF79D130}"/>
-    <dgm:cxn modelId="{B5FF1EA6-4562-445C-A4D2-8CE1DAE3FAA1}" type="presOf" srcId="{2C683329-F021-46C4-873A-4A90024F5824}" destId="{4097D33A-C689-4E08-A5EE-335DF88C37F6}" srcOrd="1" destOrd="0" presId="urn:microsoft.com/office/officeart/2008/layout/HorizontalMultiLevelHierarchy"/>
+    <dgm:cxn modelId="{41300B97-CF41-49E0-A6CE-96A5E1FEDDB9}" type="presOf" srcId="{0A665E6E-7693-4B4D-957C-8DB1D6E77D6A}" destId="{C63E3B85-DB6F-4358-AD04-C7E79D27D0F9}" srcOrd="0" destOrd="0" presId="urn:microsoft.com/office/officeart/2008/layout/HorizontalMultiLevelHierarchy"/>
+    <dgm:cxn modelId="{CA7A169C-4165-4093-970C-427730032216}" type="presOf" srcId="{3915E3B0-E90D-4145-A77A-8AC6F1A9DF88}" destId="{37469FC6-F97C-4564-BD28-5FB6D4A4424E}" srcOrd="1" destOrd="0" presId="urn:microsoft.com/office/officeart/2008/layout/HorizontalMultiLevelHierarchy"/>
+    <dgm:cxn modelId="{8227C99D-21D2-4985-8965-F30DF49F92FC}" type="presOf" srcId="{61E87D97-3F82-4F6C-99EF-A96351AE42AA}" destId="{CC83036E-2DF9-4076-BD5A-4FFFC4C489CB}" srcOrd="0" destOrd="0" presId="urn:microsoft.com/office/officeart/2008/layout/HorizontalMultiLevelHierarchy"/>
     <dgm:cxn modelId="{E56C4DA6-57EF-4377-B53D-63630FBE1C1C}" srcId="{D114562E-C9BE-49CB-A279-37874B8BFB98}" destId="{61E87D97-3F82-4F6C-99EF-A96351AE42AA}" srcOrd="1" destOrd="0" parTransId="{A2045D68-1DD4-4AD0-999F-7EBB27022E91}" sibTransId="{A4B6EAD9-12A5-4023-BB9C-BCE6F121E781}"/>
-    <dgm:cxn modelId="{069985AE-ECD2-4F49-874F-806D52017674}" type="presOf" srcId="{5C3EDCDC-DF4C-4B63-8217-2313688AFDDB}" destId="{E47D70A8-9449-4BA9-81D4-07206E945891}" srcOrd="0" destOrd="0" presId="urn:microsoft.com/office/officeart/2008/layout/HorizontalMultiLevelHierarchy"/>
-    <dgm:cxn modelId="{4F80DFBB-C771-4AC9-80C0-EEF57EB9EBFB}" srcId="{92F16719-4314-4855-9060-5929ED43F413}" destId="{D114562E-C9BE-49CB-A279-37874B8BFB98}" srcOrd="1" destOrd="0" parTransId="{58C21C66-1A24-49F9-9269-1FAE2381270D}" sibTransId="{A3130F60-EE7F-4928-941E-1FD97A3BD954}"/>
-    <dgm:cxn modelId="{F60C09BC-D93C-4241-9A8A-91118EC27645}" type="presOf" srcId="{AE6F42EE-05BA-404B-9EB9-6795E6693D09}" destId="{000A9F72-345C-4272-9599-355C5BF14E00}" srcOrd="1" destOrd="0" presId="urn:microsoft.com/office/officeart/2008/layout/HorizontalMultiLevelHierarchy"/>
-    <dgm:cxn modelId="{93CD25BE-3495-417B-A12B-859CF58D67D6}" srcId="{92F16719-4314-4855-9060-5929ED43F413}" destId="{B81E2989-389E-4FCB-A58E-4C131C569AB8}" srcOrd="2" destOrd="0" parTransId="{D00E739B-1489-4748-BCE8-C6F5BD364405}" sibTransId="{B89B1992-375C-4DB9-8C9D-46EEC7D15DC0}"/>
-    <dgm:cxn modelId="{39BD8DC0-BFEA-48C5-B819-9044A248FF74}" type="presOf" srcId="{AB26AC4C-94D8-4E12-8FD2-335821A03BDC}" destId="{8D515895-ACF2-4C34-9E6A-146C8645314E}" srcOrd="0" destOrd="0" presId="urn:microsoft.com/office/officeart/2008/layout/HorizontalMultiLevelHierarchy"/>
-    <dgm:cxn modelId="{5EC992D3-0C12-450A-BF15-9B376FE47DA9}" type="presOf" srcId="{D00E739B-1489-4748-BCE8-C6F5BD364405}" destId="{452CAEC8-30FA-4E4A-A0CD-B145BF3AF42F}" srcOrd="0" destOrd="0" presId="urn:microsoft.com/office/officeart/2008/layout/HorizontalMultiLevelHierarchy"/>
-    <dgm:cxn modelId="{23D3E6D6-ABAF-4218-8D0C-4FD94565BB9D}" type="presOf" srcId="{B81E2989-389E-4FCB-A58E-4C131C569AB8}" destId="{8BFE763E-1F61-43EB-86C6-6758D7B275C0}" srcOrd="0" destOrd="0" presId="urn:microsoft.com/office/officeart/2008/layout/HorizontalMultiLevelHierarchy"/>
-    <dgm:cxn modelId="{56CE99DF-B7F3-432B-8B7D-E80DD254E9C5}" type="presOf" srcId="{61E87D97-3F82-4F6C-99EF-A96351AE42AA}" destId="{CC83036E-2DF9-4076-BD5A-4FFFC4C489CB}" srcOrd="0" destOrd="0" presId="urn:microsoft.com/office/officeart/2008/layout/HorizontalMultiLevelHierarchy"/>
-    <dgm:cxn modelId="{7CD252E3-052A-45B3-82AE-B367F861B0FD}" srcId="{92F16719-4314-4855-9060-5929ED43F413}" destId="{BB07FD72-BBD0-4A83-A33E-C314DF094299}" srcOrd="0" destOrd="0" parTransId="{AE6F42EE-05BA-404B-9EB9-6795E6693D09}" sibTransId="{901D98B0-1776-47DA-B43B-D0464A2490E4}"/>
-    <dgm:cxn modelId="{0D9359E8-7F46-455E-B238-A6F162A748E6}" type="presOf" srcId="{3915E3B0-E90D-4145-A77A-8AC6F1A9DF88}" destId="{5D3E1F1E-DE1B-42AF-BA46-55CB2B590D43}" srcOrd="0" destOrd="0" presId="urn:microsoft.com/office/officeart/2008/layout/HorizontalMultiLevelHierarchy"/>
-    <dgm:cxn modelId="{07B7B1F8-742C-4B2A-86DF-14F480E319E6}" type="presOf" srcId="{A2045D68-1DD4-4AD0-999F-7EBB27022E91}" destId="{4E950AA0-5003-43C1-BB95-727AB5C079C1}" srcOrd="1" destOrd="0" presId="urn:microsoft.com/office/officeart/2008/layout/HorizontalMultiLevelHierarchy"/>
-    <dgm:cxn modelId="{FAEABFFA-2AC6-449F-A735-BDE6B4051BE2}" type="presOf" srcId="{58C21C66-1A24-49F9-9269-1FAE2381270D}" destId="{0208604E-140B-40D2-A7E8-09F6F94BB223}" srcOrd="1" destOrd="0" presId="urn:microsoft.com/office/officeart/2008/layout/HorizontalMultiLevelHierarchy"/>
-    <dgm:cxn modelId="{4C76D28E-A819-4BF3-AA14-7219FCC3A0A5}" type="presParOf" srcId="{FA891ABF-C99F-4A23-A210-2A4F0440584A}" destId="{5F265EC5-10EA-4CE7-B990-0D8A4B4B4AA5}" srcOrd="0" destOrd="0" presId="urn:microsoft.com/office/officeart/2008/layout/HorizontalMultiLevelHierarchy"/>
-    <dgm:cxn modelId="{B2FFD92E-F18E-4DE5-88BF-DDF4AC714AAE}" type="presParOf" srcId="{5F265EC5-10EA-4CE7-B990-0D8A4B4B4AA5}" destId="{62D217EF-F3EF-442A-9728-0F6250A80547}" srcOrd="0" destOrd="0" presId="urn:microsoft.com/office/officeart/2008/layout/HorizontalMultiLevelHierarchy"/>
-    <dgm:cxn modelId="{55F46546-C33F-4510-9206-A168BB20C7D9}" type="presParOf" srcId="{5F265EC5-10EA-4CE7-B990-0D8A4B4B4AA5}" destId="{7FEC6CA3-E19F-473E-AB49-A1A320644F97}" srcOrd="1" destOrd="0" presId="urn:microsoft.com/office/officeart/2008/layout/HorizontalMultiLevelHierarchy"/>
-    <dgm:cxn modelId="{6E78A7DC-6E61-4B4C-A710-2488873133F8}" type="presParOf" srcId="{7FEC6CA3-E19F-473E-AB49-A1A320644F97}" destId="{8F8123F4-E80D-407E-B824-28C40A5675FD}" srcOrd="0" destOrd="0" presId="urn:microsoft.com/office/officeart/2008/layout/HorizontalMultiLevelHierarchy"/>
-    <dgm:cxn modelId="{E8538D20-EF17-4C0D-A520-3BBC22576996}" type="presParOf" srcId="{8F8123F4-E80D-407E-B824-28C40A5675FD}" destId="{000A9F72-345C-4272-9599-355C5BF14E00}" srcOrd="0" destOrd="0" presId="urn:microsoft.com/office/officeart/2008/layout/HorizontalMultiLevelHierarchy"/>
-    <dgm:cxn modelId="{01C76755-4044-41A0-BF8C-FA5B54BD09BE}" type="presParOf" srcId="{7FEC6CA3-E19F-473E-AB49-A1A320644F97}" destId="{409554E5-22E2-45D9-AB39-8E38CD3905E8}" srcOrd="1" destOrd="0" presId="urn:microsoft.com/office/officeart/2008/layout/HorizontalMultiLevelHierarchy"/>
-    <dgm:cxn modelId="{BDDB7EC3-26A3-49B3-A996-8902DB07AB60}" type="presParOf" srcId="{409554E5-22E2-45D9-AB39-8E38CD3905E8}" destId="{576BC15B-169B-4BA9-BA1B-CA768D797C57}" srcOrd="0" destOrd="0" presId="urn:microsoft.com/office/officeart/2008/layout/HorizontalMultiLevelHierarchy"/>
-    <dgm:cxn modelId="{16111373-D98C-4053-8EC1-93FA8D6510CB}" type="presParOf" srcId="{409554E5-22E2-45D9-AB39-8E38CD3905E8}" destId="{EC799BB0-2433-423F-ABA8-87CF306F3ACA}" srcOrd="1" destOrd="0" presId="urn:microsoft.com/office/officeart/2008/layout/HorizontalMultiLevelHierarchy"/>
-    <dgm:cxn modelId="{C0C14686-F153-49A7-BFF9-6C2117944069}" type="presParOf" srcId="{7FEC6CA3-E19F-473E-AB49-A1A320644F97}" destId="{34D9AAE3-5725-4E9F-BDDB-DEB9447AD4B3}" srcOrd="2" destOrd="0" presId="urn:microsoft.com/office/officeart/2008/layout/HorizontalMultiLevelHierarchy"/>
-    <dgm:cxn modelId="{14EEF8B8-144D-4107-8BAE-E7B8522C1896}" type="presParOf" srcId="{34D9AAE3-5725-4E9F-BDDB-DEB9447AD4B3}" destId="{0208604E-140B-40D2-A7E8-09F6F94BB223}" srcOrd="0" destOrd="0" presId="urn:microsoft.com/office/officeart/2008/layout/HorizontalMultiLevelHierarchy"/>
-    <dgm:cxn modelId="{B2D8AAED-C868-4CAC-8FEB-C3D5AF3ED2AB}" type="presParOf" srcId="{7FEC6CA3-E19F-473E-AB49-A1A320644F97}" destId="{2C359AD2-22D1-414E-AA84-7DED84EDFCBA}" srcOrd="3" destOrd="0" presId="urn:microsoft.com/office/officeart/2008/layout/HorizontalMultiLevelHierarchy"/>
-    <dgm:cxn modelId="{21249F49-F7BE-4917-9678-000C4F87E963}" type="presParOf" srcId="{2C359AD2-22D1-414E-AA84-7DED84EDFCBA}" destId="{23C82D94-A270-4AB9-8A2D-D31F996A4AF1}" srcOrd="0" destOrd="0" presId="urn:microsoft.com/office/officeart/2008/layout/HorizontalMultiLevelHierarchy"/>
-    <dgm:cxn modelId="{AE5BCF42-1A48-4597-9511-333CADD95837}" type="presParOf" srcId="{2C359AD2-22D1-414E-AA84-7DED84EDFCBA}" destId="{C3A46373-48B0-48F6-AEB3-94B3CEDF4DCD}" srcOrd="1" destOrd="0" presId="urn:microsoft.com/office/officeart/2008/layout/HorizontalMultiLevelHierarchy"/>
-    <dgm:cxn modelId="{A84AB458-D786-4C8A-AAAF-7F6633C09C57}" type="presParOf" srcId="{C3A46373-48B0-48F6-AEB3-94B3CEDF4DCD}" destId="{5D3E1F1E-DE1B-42AF-BA46-55CB2B590D43}" srcOrd="0" destOrd="0" presId="urn:microsoft.com/office/officeart/2008/layout/HorizontalMultiLevelHierarchy"/>
-    <dgm:cxn modelId="{12550B08-25D8-47E0-97E2-BFC9555E4B17}" type="presParOf" srcId="{5D3E1F1E-DE1B-42AF-BA46-55CB2B590D43}" destId="{37469FC6-F97C-4564-BD28-5FB6D4A4424E}" srcOrd="0" destOrd="0" presId="urn:microsoft.com/office/officeart/2008/layout/HorizontalMultiLevelHierarchy"/>
-    <dgm:cxn modelId="{9B043B97-F09B-4B52-960D-B8F3134F32F3}" type="presParOf" srcId="{C3A46373-48B0-48F6-AEB3-94B3CEDF4DCD}" destId="{4C40D167-6C91-4AA0-8868-B3E707D0ECAC}" srcOrd="1" destOrd="0" presId="urn:microsoft.com/office/officeart/2008/layout/HorizontalMultiLevelHierarchy"/>
-    <dgm:cxn modelId="{43EEA43F-F304-4868-9D5B-148CD17062EA}" type="presParOf" srcId="{4C40D167-6C91-4AA0-8868-B3E707D0ECAC}" destId="{C63E3B85-DB6F-4358-AD04-C7E79D27D0F9}" srcOrd="0" destOrd="0" presId="urn:microsoft.com/office/officeart/2008/layout/HorizontalMultiLevelHierarchy"/>
-    <dgm:cxn modelId="{F29B2DE0-1671-4732-866B-7936AF4D71F9}" type="presParOf" srcId="{4C40D167-6C91-4AA0-8868-B3E707D0ECAC}" destId="{1FF39D6F-DEAC-411A-91CB-5CC5798BB2B0}" srcOrd="1" destOrd="0" presId="urn:microsoft.com/office/officeart/2008/layout/HorizontalMultiLevelHierarchy"/>
-    <dgm:cxn modelId="{31D0650C-B511-4028-AFB8-6BEB5219F622}" type="presParOf" srcId="{C3A46373-48B0-48F6-AEB3-94B3CEDF4DCD}" destId="{46EA138D-EC26-4575-8A60-6B619CF0FFA4}" srcOrd="2" destOrd="0" presId="urn:microsoft.com/office/officeart/2008/layout/HorizontalMultiLevelHierarchy"/>
-    <dgm:cxn modelId="{D73983A9-243D-434E-B8A5-28D7898AD818}" type="presParOf" srcId="{46EA138D-EC26-4575-8A60-6B619CF0FFA4}" destId="{4E950AA0-5003-43C1-BB95-727AB5C079C1}" srcOrd="0" destOrd="0" presId="urn:microsoft.com/office/officeart/2008/layout/HorizontalMultiLevelHierarchy"/>
-    <dgm:cxn modelId="{A8E8574C-9FD7-4706-93B9-151C5B2CECE7}" type="presParOf" srcId="{C3A46373-48B0-48F6-AEB3-94B3CEDF4DCD}" destId="{C4CD80C0-41ED-4212-B216-020ED8F0CC6B}" srcOrd="3" destOrd="0" presId="urn:microsoft.com/office/officeart/2008/layout/HorizontalMultiLevelHierarchy"/>
-    <dgm:cxn modelId="{9F72D2BA-4BB6-4775-95CF-22898AA9B553}" type="presParOf" srcId="{C4CD80C0-41ED-4212-B216-020ED8F0CC6B}" destId="{CC83036E-2DF9-4076-BD5A-4FFFC4C489CB}" srcOrd="0" destOrd="0" presId="urn:microsoft.com/office/officeart/2008/layout/HorizontalMultiLevelHierarchy"/>
-    <dgm:cxn modelId="{C3B5DEDA-F848-401A-922C-7BCDDE96D550}" type="presParOf" srcId="{C4CD80C0-41ED-4212-B216-020ED8F0CC6B}" destId="{54819D07-0508-4B63-B552-91B6348008A4}" srcOrd="1" destOrd="0" presId="urn:microsoft.com/office/officeart/2008/layout/HorizontalMultiLevelHierarchy"/>
-    <dgm:cxn modelId="{A761E9A5-51C4-4B12-BB89-CFAFEB7B289D}" type="presParOf" srcId="{C3A46373-48B0-48F6-AEB3-94B3CEDF4DCD}" destId="{8B1D37C4-BE69-4E8F-8073-932B19B29946}" srcOrd="4" destOrd="0" presId="urn:microsoft.com/office/officeart/2008/layout/HorizontalMultiLevelHierarchy"/>
-    <dgm:cxn modelId="{8636C100-CE7E-4345-889C-DFF4FE61AD8B}" type="presParOf" srcId="{8B1D37C4-BE69-4E8F-8073-932B19B29946}" destId="{4097D33A-C689-4E08-A5EE-335DF88C37F6}" srcOrd="0" destOrd="0" presId="urn:microsoft.com/office/officeart/2008/layout/HorizontalMultiLevelHierarchy"/>
-    <dgm:cxn modelId="{311B4EDC-9CC6-4556-B06D-2C0F6B37B959}" type="presParOf" srcId="{C3A46373-48B0-48F6-AEB3-94B3CEDF4DCD}" destId="{4FDDD39C-ECF9-4356-B317-9DBF7A3901AE}" srcOrd="5" destOrd="0" presId="urn:microsoft.com/office/officeart/2008/layout/HorizontalMultiLevelHierarchy"/>
-    <dgm:cxn modelId="{542723C6-FC4E-40D4-9787-B2B63461BDA8}" type="presParOf" srcId="{4FDDD39C-ECF9-4356-B317-9DBF7A3901AE}" destId="{599E43A8-1BED-49D5-BE29-4DA6FD83C36B}" srcOrd="0" destOrd="0" presId="urn:microsoft.com/office/officeart/2008/layout/HorizontalMultiLevelHierarchy"/>
-    <dgm:cxn modelId="{BB43CC2C-1872-4535-AC26-7717AA8F7777}" type="presParOf" srcId="{4FDDD39C-ECF9-4356-B317-9DBF7A3901AE}" destId="{AD7A3A98-55B6-4BF4-990B-1E30C9200F74}" srcOrd="1" destOrd="0" presId="urn:microsoft.com/office/officeart/2008/layout/HorizontalMultiLevelHierarchy"/>
-    <dgm:cxn modelId="{C331A81F-3AAD-4639-80D0-275519F9538B}" type="presParOf" srcId="{C3A46373-48B0-48F6-AEB3-94B3CEDF4DCD}" destId="{E47D70A8-9449-4BA9-81D4-07206E945891}" srcOrd="6" destOrd="0" presId="urn:microsoft.com/office/officeart/2008/layout/HorizontalMultiLevelHierarchy"/>
-    <dgm:cxn modelId="{8A9E6F8B-9BE0-48A6-A718-F0735EECC6B2}" type="presParOf" srcId="{E47D70A8-9449-4BA9-81D4-07206E945891}" destId="{5919FB03-1F63-4400-A1AD-748A7B57E0A6}" srcOrd="0" destOrd="0" presId="urn:microsoft.com/office/officeart/2008/layout/HorizontalMultiLevelHierarchy"/>
-    <dgm:cxn modelId="{B4C6FD34-37BA-49F9-BB33-04FDB283D3BF}" type="presParOf" srcId="{C3A46373-48B0-48F6-AEB3-94B3CEDF4DCD}" destId="{AC5D55A3-6674-4A9D-B80E-73F96726E7CF}" srcOrd="7" destOrd="0" presId="urn:microsoft.com/office/officeart/2008/layout/HorizontalMultiLevelHierarchy"/>
-    <dgm:cxn modelId="{0EC32DE7-C466-4596-B5F5-EF51FF93CFAC}" type="presParOf" srcId="{AC5D55A3-6674-4A9D-B80E-73F96726E7CF}" destId="{8D515895-ACF2-4C34-9E6A-146C8645314E}" srcOrd="0" destOrd="0" presId="urn:microsoft.com/office/officeart/2008/layout/HorizontalMultiLevelHierarchy"/>
-    <dgm:cxn modelId="{23C2232C-F670-4199-A9A3-F2BE349B643A}" type="presParOf" srcId="{AC5D55A3-6674-4A9D-B80E-73F96726E7CF}" destId="{BD379F1F-B6B1-46B2-AB07-F32E03CFC060}" srcOrd="1" destOrd="0" presId="urn:microsoft.com/office/officeart/2008/layout/HorizontalMultiLevelHierarchy"/>
-    <dgm:cxn modelId="{7745162C-B7AB-405D-8439-2E5153A1D552}" type="presParOf" srcId="{7FEC6CA3-E19F-473E-AB49-A1A320644F97}" destId="{452CAEC8-30FA-4E4A-A0CD-B145BF3AF42F}" srcOrd="4" destOrd="0" presId="urn:microsoft.com/office/officeart/2008/layout/HorizontalMultiLevelHierarchy"/>
-    <dgm:cxn modelId="{24A9ADF8-B9D5-4CFD-8335-C44A31BA7438}" type="presParOf" srcId="{452CAEC8-30FA-4E4A-A0CD-B145BF3AF42F}" destId="{71A76CF3-AD04-4A62-A6F8-547099891DBE}" srcOrd="0" destOrd="0" presId="urn:microsoft.com/office/officeart/2008/layout/HorizontalMultiLevelHierarchy"/>
-    <dgm:cxn modelId="{09D16CAD-CF63-4933-A318-4532CB24D38F}" type="presParOf" srcId="{7FEC6CA3-E19F-473E-AB49-A1A320644F97}" destId="{648FD88E-1A7E-4AFB-8C7C-3AB3C527BB57}" srcOrd="5" destOrd="0" presId="urn:microsoft.com/office/officeart/2008/layout/HorizontalMultiLevelHierarchy"/>
-    <dgm:cxn modelId="{64ACA45A-50EB-4EA5-9365-1121238DD23E}" type="presParOf" srcId="{648FD88E-1A7E-4AFB-8C7C-3AB3C527BB57}" destId="{8BFE763E-1F61-43EB-86C6-6758D7B275C0}" srcOrd="0" destOrd="0" presId="urn:microsoft.com/office/officeart/2008/layout/HorizontalMultiLevelHierarchy"/>
-    <dgm:cxn modelId="{F8868EC9-F1C7-4DE1-AFFC-04CE74CA69EF}" type="presParOf" srcId="{648FD88E-1A7E-4AFB-8C7C-3AB3C527BB57}" destId="{F74EABC8-8330-4BE5-985E-DFADAD390910}" srcOrd="1" destOrd="0" presId="urn:microsoft.com/office/officeart/2008/layout/HorizontalMultiLevelHierarchy"/>
+    <dgm:cxn modelId="{ACBB66B3-3FEC-4CE0-AAE1-A5D93D4223AB}" type="presOf" srcId="{5C3EDCDC-DF4C-4B63-8217-2313688AFDDB}" destId="{5919FB03-1F63-4400-A1AD-748A7B57E0A6}" srcOrd="1" destOrd="0" presId="urn:microsoft.com/office/officeart/2008/layout/HorizontalMultiLevelHierarchy"/>
+    <dgm:cxn modelId="{4F80DFBB-C771-4AC9-80C0-EEF57EB9EBFB}" srcId="{92F16719-4314-4855-9060-5929ED43F413}" destId="{D114562E-C9BE-49CB-A279-37874B8BFB98}" srcOrd="2" destOrd="0" parTransId="{58C21C66-1A24-49F9-9269-1FAE2381270D}" sibTransId="{A3130F60-EE7F-4928-941E-1FD97A3BD954}"/>
+    <dgm:cxn modelId="{250C44BC-77E7-49A9-8288-BE54DE771322}" type="presOf" srcId="{99FBDE0D-32AD-451E-A36F-39F6040D8BC0}" destId="{599E43A8-1BED-49D5-BE29-4DA6FD83C36B}" srcOrd="0" destOrd="0" presId="urn:microsoft.com/office/officeart/2008/layout/HorizontalMultiLevelHierarchy"/>
+    <dgm:cxn modelId="{93CD25BE-3495-417B-A12B-859CF58D67D6}" srcId="{92F16719-4314-4855-9060-5929ED43F413}" destId="{B81E2989-389E-4FCB-A58E-4C131C569AB8}" srcOrd="0" destOrd="0" parTransId="{D00E739B-1489-4748-BCE8-C6F5BD364405}" sibTransId="{B89B1992-375C-4DB9-8C9D-46EEC7D15DC0}"/>
+    <dgm:cxn modelId="{834D5BC0-18E0-4127-A36D-9B350A97D46E}" type="presOf" srcId="{3915E3B0-E90D-4145-A77A-8AC6F1A9DF88}" destId="{5D3E1F1E-DE1B-42AF-BA46-55CB2B590D43}" srcOrd="0" destOrd="0" presId="urn:microsoft.com/office/officeart/2008/layout/HorizontalMultiLevelHierarchy"/>
+    <dgm:cxn modelId="{805423CC-C9E5-4B2D-9E9B-F5FFF4133167}" type="presOf" srcId="{5C3EDCDC-DF4C-4B63-8217-2313688AFDDB}" destId="{E47D70A8-9449-4BA9-81D4-07206E945891}" srcOrd="0" destOrd="0" presId="urn:microsoft.com/office/officeart/2008/layout/HorizontalMultiLevelHierarchy"/>
+    <dgm:cxn modelId="{D6BEBCD1-6FB4-4337-9332-07881A5EC57E}" type="presOf" srcId="{58C21C66-1A24-49F9-9269-1FAE2381270D}" destId="{34D9AAE3-5725-4E9F-BDDB-DEB9447AD4B3}" srcOrd="0" destOrd="0" presId="urn:microsoft.com/office/officeart/2008/layout/HorizontalMultiLevelHierarchy"/>
+    <dgm:cxn modelId="{016A80D7-12DE-43C9-91E7-E153559404F3}" type="presOf" srcId="{D114562E-C9BE-49CB-A279-37874B8BFB98}" destId="{23C82D94-A270-4AB9-8A2D-D31F996A4AF1}" srcOrd="0" destOrd="0" presId="urn:microsoft.com/office/officeart/2008/layout/HorizontalMultiLevelHierarchy"/>
+    <dgm:cxn modelId="{562B13E3-23EF-4E26-A953-D66DFD45D219}" type="presOf" srcId="{D00E739B-1489-4748-BCE8-C6F5BD364405}" destId="{452CAEC8-30FA-4E4A-A0CD-B145BF3AF42F}" srcOrd="0" destOrd="0" presId="urn:microsoft.com/office/officeart/2008/layout/HorizontalMultiLevelHierarchy"/>
+    <dgm:cxn modelId="{7CD252E3-052A-45B3-82AE-B367F861B0FD}" srcId="{92F16719-4314-4855-9060-5929ED43F413}" destId="{BB07FD72-BBD0-4A83-A33E-C314DF094299}" srcOrd="1" destOrd="0" parTransId="{AE6F42EE-05BA-404B-9EB9-6795E6693D09}" sibTransId="{901D98B0-1776-47DA-B43B-D0464A2490E4}"/>
+    <dgm:cxn modelId="{3B0E51E9-F37A-4339-A380-9073E39D1D6B}" type="presOf" srcId="{AE6F42EE-05BA-404B-9EB9-6795E6693D09}" destId="{8F8123F4-E80D-407E-B824-28C40A5675FD}" srcOrd="0" destOrd="0" presId="urn:microsoft.com/office/officeart/2008/layout/HorizontalMultiLevelHierarchy"/>
+    <dgm:cxn modelId="{20CD1FF3-762E-48A5-9451-35FCAF3B1D93}" type="presOf" srcId="{BB07FD72-BBD0-4A83-A33E-C314DF094299}" destId="{576BC15B-169B-4BA9-BA1B-CA768D797C57}" srcOrd="0" destOrd="0" presId="urn:microsoft.com/office/officeart/2008/layout/HorizontalMultiLevelHierarchy"/>
+    <dgm:cxn modelId="{8DC3DBFE-95BE-47E0-8AEA-B8607F9849DC}" type="presOf" srcId="{A2045D68-1DD4-4AD0-999F-7EBB27022E91}" destId="{4E950AA0-5003-43C1-BB95-727AB5C079C1}" srcOrd="1" destOrd="0" presId="urn:microsoft.com/office/officeart/2008/layout/HorizontalMultiLevelHierarchy"/>
+    <dgm:cxn modelId="{0B79169E-1081-462D-ABB3-3738CA33574B}" type="presParOf" srcId="{FA891ABF-C99F-4A23-A210-2A4F0440584A}" destId="{5F265EC5-10EA-4CE7-B990-0D8A4B4B4AA5}" srcOrd="0" destOrd="0" presId="urn:microsoft.com/office/officeart/2008/layout/HorizontalMultiLevelHierarchy"/>
+    <dgm:cxn modelId="{EB8E34A9-ADF7-4EAB-B1B8-CDC63D09888B}" type="presParOf" srcId="{5F265EC5-10EA-4CE7-B990-0D8A4B4B4AA5}" destId="{62D217EF-F3EF-442A-9728-0F6250A80547}" srcOrd="0" destOrd="0" presId="urn:microsoft.com/office/officeart/2008/layout/HorizontalMultiLevelHierarchy"/>
+    <dgm:cxn modelId="{1895509C-3CAB-45E6-AF24-6B615CD018EF}" type="presParOf" srcId="{5F265EC5-10EA-4CE7-B990-0D8A4B4B4AA5}" destId="{7FEC6CA3-E19F-473E-AB49-A1A320644F97}" srcOrd="1" destOrd="0" presId="urn:microsoft.com/office/officeart/2008/layout/HorizontalMultiLevelHierarchy"/>
+    <dgm:cxn modelId="{CB55EB82-B918-4363-9F98-C0A019CA45E4}" type="presParOf" srcId="{7FEC6CA3-E19F-473E-AB49-A1A320644F97}" destId="{452CAEC8-30FA-4E4A-A0CD-B145BF3AF42F}" srcOrd="0" destOrd="0" presId="urn:microsoft.com/office/officeart/2008/layout/HorizontalMultiLevelHierarchy"/>
+    <dgm:cxn modelId="{E031DF7E-B638-4279-A877-9AA3F8FA1EFB}" type="presParOf" srcId="{452CAEC8-30FA-4E4A-A0CD-B145BF3AF42F}" destId="{71A76CF3-AD04-4A62-A6F8-547099891DBE}" srcOrd="0" destOrd="0" presId="urn:microsoft.com/office/officeart/2008/layout/HorizontalMultiLevelHierarchy"/>
+    <dgm:cxn modelId="{0A686759-738F-4F22-96B7-A75E68DBF55E}" type="presParOf" srcId="{7FEC6CA3-E19F-473E-AB49-A1A320644F97}" destId="{648FD88E-1A7E-4AFB-8C7C-3AB3C527BB57}" srcOrd="1" destOrd="0" presId="urn:microsoft.com/office/officeart/2008/layout/HorizontalMultiLevelHierarchy"/>
+    <dgm:cxn modelId="{01E5EEC1-A43A-4242-A29F-12A95994EBC6}" type="presParOf" srcId="{648FD88E-1A7E-4AFB-8C7C-3AB3C527BB57}" destId="{8BFE763E-1F61-43EB-86C6-6758D7B275C0}" srcOrd="0" destOrd="0" presId="urn:microsoft.com/office/officeart/2008/layout/HorizontalMultiLevelHierarchy"/>
+    <dgm:cxn modelId="{BFAC4307-6228-4573-8AFC-8FCEF8B1A26F}" type="presParOf" srcId="{648FD88E-1A7E-4AFB-8C7C-3AB3C527BB57}" destId="{F74EABC8-8330-4BE5-985E-DFADAD390910}" srcOrd="1" destOrd="0" presId="urn:microsoft.com/office/officeart/2008/layout/HorizontalMultiLevelHierarchy"/>
+    <dgm:cxn modelId="{7E243A8B-53AD-460C-81DA-C02D4095A5EC}" type="presParOf" srcId="{7FEC6CA3-E19F-473E-AB49-A1A320644F97}" destId="{8F8123F4-E80D-407E-B824-28C40A5675FD}" srcOrd="2" destOrd="0" presId="urn:microsoft.com/office/officeart/2008/layout/HorizontalMultiLevelHierarchy"/>
+    <dgm:cxn modelId="{F7846200-1144-4747-AD2D-CDDD124DDE1E}" type="presParOf" srcId="{8F8123F4-E80D-407E-B824-28C40A5675FD}" destId="{000A9F72-345C-4272-9599-355C5BF14E00}" srcOrd="0" destOrd="0" presId="urn:microsoft.com/office/officeart/2008/layout/HorizontalMultiLevelHierarchy"/>
+    <dgm:cxn modelId="{B5AD6839-3D13-4592-A54A-975641D78FF6}" type="presParOf" srcId="{7FEC6CA3-E19F-473E-AB49-A1A320644F97}" destId="{409554E5-22E2-45D9-AB39-8E38CD3905E8}" srcOrd="3" destOrd="0" presId="urn:microsoft.com/office/officeart/2008/layout/HorizontalMultiLevelHierarchy"/>
+    <dgm:cxn modelId="{B5EE325C-6B71-4529-82C1-07B947DE0089}" type="presParOf" srcId="{409554E5-22E2-45D9-AB39-8E38CD3905E8}" destId="{576BC15B-169B-4BA9-BA1B-CA768D797C57}" srcOrd="0" destOrd="0" presId="urn:microsoft.com/office/officeart/2008/layout/HorizontalMultiLevelHierarchy"/>
+    <dgm:cxn modelId="{8F518533-A8E8-4DB0-93EA-F3FEDB2CCDD1}" type="presParOf" srcId="{409554E5-22E2-45D9-AB39-8E38CD3905E8}" destId="{EC799BB0-2433-423F-ABA8-87CF306F3ACA}" srcOrd="1" destOrd="0" presId="urn:microsoft.com/office/officeart/2008/layout/HorizontalMultiLevelHierarchy"/>
+    <dgm:cxn modelId="{CD3BEA3E-CDE2-49D0-AF19-E5D61BA32311}" type="presParOf" srcId="{7FEC6CA3-E19F-473E-AB49-A1A320644F97}" destId="{34D9AAE3-5725-4E9F-BDDB-DEB9447AD4B3}" srcOrd="4" destOrd="0" presId="urn:microsoft.com/office/officeart/2008/layout/HorizontalMultiLevelHierarchy"/>
+    <dgm:cxn modelId="{B52CA6F5-0D26-477D-A8BD-1A80F4196394}" type="presParOf" srcId="{34D9AAE3-5725-4E9F-BDDB-DEB9447AD4B3}" destId="{0208604E-140B-40D2-A7E8-09F6F94BB223}" srcOrd="0" destOrd="0" presId="urn:microsoft.com/office/officeart/2008/layout/HorizontalMultiLevelHierarchy"/>
+    <dgm:cxn modelId="{85F19BE2-27E6-48E3-8C4A-CC548C4B790E}" type="presParOf" srcId="{7FEC6CA3-E19F-473E-AB49-A1A320644F97}" destId="{2C359AD2-22D1-414E-AA84-7DED84EDFCBA}" srcOrd="5" destOrd="0" presId="urn:microsoft.com/office/officeart/2008/layout/HorizontalMultiLevelHierarchy"/>
+    <dgm:cxn modelId="{52AA6944-245B-4B64-8DFC-E3FFFC209AF8}" type="presParOf" srcId="{2C359AD2-22D1-414E-AA84-7DED84EDFCBA}" destId="{23C82D94-A270-4AB9-8A2D-D31F996A4AF1}" srcOrd="0" destOrd="0" presId="urn:microsoft.com/office/officeart/2008/layout/HorizontalMultiLevelHierarchy"/>
+    <dgm:cxn modelId="{EA893C29-26EE-413C-BA06-FB8BCC22A283}" type="presParOf" srcId="{2C359AD2-22D1-414E-AA84-7DED84EDFCBA}" destId="{C3A46373-48B0-48F6-AEB3-94B3CEDF4DCD}" srcOrd="1" destOrd="0" presId="urn:microsoft.com/office/officeart/2008/layout/HorizontalMultiLevelHierarchy"/>
+    <dgm:cxn modelId="{66CA08AE-5C53-477F-A030-08D6D8B0C59A}" type="presParOf" srcId="{C3A46373-48B0-48F6-AEB3-94B3CEDF4DCD}" destId="{5D3E1F1E-DE1B-42AF-BA46-55CB2B590D43}" srcOrd="0" destOrd="0" presId="urn:microsoft.com/office/officeart/2008/layout/HorizontalMultiLevelHierarchy"/>
+    <dgm:cxn modelId="{6F86E374-9C6A-45D2-B30B-4EDF38DE9B26}" type="presParOf" srcId="{5D3E1F1E-DE1B-42AF-BA46-55CB2B590D43}" destId="{37469FC6-F97C-4564-BD28-5FB6D4A4424E}" srcOrd="0" destOrd="0" presId="urn:microsoft.com/office/officeart/2008/layout/HorizontalMultiLevelHierarchy"/>
+    <dgm:cxn modelId="{038A8149-7BCB-426A-ABB3-EE260151F39D}" type="presParOf" srcId="{C3A46373-48B0-48F6-AEB3-94B3CEDF4DCD}" destId="{4C40D167-6C91-4AA0-8868-B3E707D0ECAC}" srcOrd="1" destOrd="0" presId="urn:microsoft.com/office/officeart/2008/layout/HorizontalMultiLevelHierarchy"/>
+    <dgm:cxn modelId="{E23F2AD3-C8CF-4E5F-9E54-C697B7189BCA}" type="presParOf" srcId="{4C40D167-6C91-4AA0-8868-B3E707D0ECAC}" destId="{C63E3B85-DB6F-4358-AD04-C7E79D27D0F9}" srcOrd="0" destOrd="0" presId="urn:microsoft.com/office/officeart/2008/layout/HorizontalMultiLevelHierarchy"/>
+    <dgm:cxn modelId="{B6E2FC15-E392-4C7B-BA73-2B6D75A0ECE2}" type="presParOf" srcId="{4C40D167-6C91-4AA0-8868-B3E707D0ECAC}" destId="{1FF39D6F-DEAC-411A-91CB-5CC5798BB2B0}" srcOrd="1" destOrd="0" presId="urn:microsoft.com/office/officeart/2008/layout/HorizontalMultiLevelHierarchy"/>
+    <dgm:cxn modelId="{6C252F09-CD2C-48C9-B84A-7781984AF2D6}" type="presParOf" srcId="{C3A46373-48B0-48F6-AEB3-94B3CEDF4DCD}" destId="{46EA138D-EC26-4575-8A60-6B619CF0FFA4}" srcOrd="2" destOrd="0" presId="urn:microsoft.com/office/officeart/2008/layout/HorizontalMultiLevelHierarchy"/>
+    <dgm:cxn modelId="{8D02D7B0-3D64-4BF3-B4F5-84D6D4FA540B}" type="presParOf" srcId="{46EA138D-EC26-4575-8A60-6B619CF0FFA4}" destId="{4E950AA0-5003-43C1-BB95-727AB5C079C1}" srcOrd="0" destOrd="0" presId="urn:microsoft.com/office/officeart/2008/layout/HorizontalMultiLevelHierarchy"/>
+    <dgm:cxn modelId="{66FBD54E-B053-480D-B462-A6AD2082F055}" type="presParOf" srcId="{C3A46373-48B0-48F6-AEB3-94B3CEDF4DCD}" destId="{C4CD80C0-41ED-4212-B216-020ED8F0CC6B}" srcOrd="3" destOrd="0" presId="urn:microsoft.com/office/officeart/2008/layout/HorizontalMultiLevelHierarchy"/>
+    <dgm:cxn modelId="{4989A2D6-440C-4A43-A26D-219B2C843AC3}" type="presParOf" srcId="{C4CD80C0-41ED-4212-B216-020ED8F0CC6B}" destId="{CC83036E-2DF9-4076-BD5A-4FFFC4C489CB}" srcOrd="0" destOrd="0" presId="urn:microsoft.com/office/officeart/2008/layout/HorizontalMultiLevelHierarchy"/>
+    <dgm:cxn modelId="{F9EDE882-74CA-44DB-9B5C-6D4B3C7A3DA5}" type="presParOf" srcId="{C4CD80C0-41ED-4212-B216-020ED8F0CC6B}" destId="{54819D07-0508-4B63-B552-91B6348008A4}" srcOrd="1" destOrd="0" presId="urn:microsoft.com/office/officeart/2008/layout/HorizontalMultiLevelHierarchy"/>
+    <dgm:cxn modelId="{BAF9C5D3-FCB5-41E2-8F33-BA744BA2BC58}" type="presParOf" srcId="{C3A46373-48B0-48F6-AEB3-94B3CEDF4DCD}" destId="{8B1D37C4-BE69-4E8F-8073-932B19B29946}" srcOrd="4" destOrd="0" presId="urn:microsoft.com/office/officeart/2008/layout/HorizontalMultiLevelHierarchy"/>
+    <dgm:cxn modelId="{3838E380-7B99-477E-9F70-158A732E959F}" type="presParOf" srcId="{8B1D37C4-BE69-4E8F-8073-932B19B29946}" destId="{4097D33A-C689-4E08-A5EE-335DF88C37F6}" srcOrd="0" destOrd="0" presId="urn:microsoft.com/office/officeart/2008/layout/HorizontalMultiLevelHierarchy"/>
+    <dgm:cxn modelId="{19773EE1-188F-439B-9647-FC17AE278094}" type="presParOf" srcId="{C3A46373-48B0-48F6-AEB3-94B3CEDF4DCD}" destId="{4FDDD39C-ECF9-4356-B317-9DBF7A3901AE}" srcOrd="5" destOrd="0" presId="urn:microsoft.com/office/officeart/2008/layout/HorizontalMultiLevelHierarchy"/>
+    <dgm:cxn modelId="{1FDF5B02-B070-406C-BDB9-BC512089780E}" type="presParOf" srcId="{4FDDD39C-ECF9-4356-B317-9DBF7A3901AE}" destId="{599E43A8-1BED-49D5-BE29-4DA6FD83C36B}" srcOrd="0" destOrd="0" presId="urn:microsoft.com/office/officeart/2008/layout/HorizontalMultiLevelHierarchy"/>
+    <dgm:cxn modelId="{CCC6AE03-E8E2-4D25-B9A6-2679C474ECC7}" type="presParOf" srcId="{4FDDD39C-ECF9-4356-B317-9DBF7A3901AE}" destId="{AD7A3A98-55B6-4BF4-990B-1E30C9200F74}" srcOrd="1" destOrd="0" presId="urn:microsoft.com/office/officeart/2008/layout/HorizontalMultiLevelHierarchy"/>
+    <dgm:cxn modelId="{A90D2E34-4686-4FE2-A47B-7EF8E4D755E2}" type="presParOf" srcId="{C3A46373-48B0-48F6-AEB3-94B3CEDF4DCD}" destId="{E47D70A8-9449-4BA9-81D4-07206E945891}" srcOrd="6" destOrd="0" presId="urn:microsoft.com/office/officeart/2008/layout/HorizontalMultiLevelHierarchy"/>
+    <dgm:cxn modelId="{F12A97E0-6D23-4DCA-B3B2-48AFD2770193}" type="presParOf" srcId="{E47D70A8-9449-4BA9-81D4-07206E945891}" destId="{5919FB03-1F63-4400-A1AD-748A7B57E0A6}" srcOrd="0" destOrd="0" presId="urn:microsoft.com/office/officeart/2008/layout/HorizontalMultiLevelHierarchy"/>
+    <dgm:cxn modelId="{661C40C6-142E-454C-A73A-491AE7810912}" type="presParOf" srcId="{C3A46373-48B0-48F6-AEB3-94B3CEDF4DCD}" destId="{AC5D55A3-6674-4A9D-B80E-73F96726E7CF}" srcOrd="7" destOrd="0" presId="urn:microsoft.com/office/officeart/2008/layout/HorizontalMultiLevelHierarchy"/>
+    <dgm:cxn modelId="{4F4C7D9F-B911-4935-A4C9-CC9C8C386910}" type="presParOf" srcId="{AC5D55A3-6674-4A9D-B80E-73F96726E7CF}" destId="{8D515895-ACF2-4C34-9E6A-146C8645314E}" srcOrd="0" destOrd="0" presId="urn:microsoft.com/office/officeart/2008/layout/HorizontalMultiLevelHierarchy"/>
+    <dgm:cxn modelId="{2629154F-C552-4718-8A5E-1FE6E19A859F}" type="presParOf" srcId="{AC5D55A3-6674-4A9D-B80E-73F96726E7CF}" destId="{BD379F1F-B6B1-46B2-AB07-F32E03CFC060}" srcOrd="1" destOrd="0" presId="urn:microsoft.com/office/officeart/2008/layout/HorizontalMultiLevelHierarchy"/>
   </dgm:cxnLst>
   <dgm:bg/>
   <dgm:whole/>
@@ -1601,15 +1649,15 @@
       <dsp:cNvGrpSpPr/>
     </dsp:nvGrpSpPr>
     <dsp:grpSpPr/>
-    <dsp:sp modelId="{452CAEC8-30FA-4E4A-A0CD-B145BF3AF42F}">
+    <dsp:sp modelId="{E47D70A8-9449-4BA9-81D4-07206E945891}">
       <dsp:nvSpPr>
         <dsp:cNvPr id="0" name=""/>
         <dsp:cNvSpPr/>
       </dsp:nvSpPr>
       <dsp:spPr>
         <a:xfrm>
-          <a:off x="916848" y="2709333"/>
-          <a:ext cx="600853" cy="1144918"/>
+          <a:off x="4496831" y="3361428"/>
+          <a:ext cx="567875" cy="1623119"/>
         </a:xfrm>
         <a:custGeom>
           <a:avLst/>
@@ -1623,13 +1671,349 @@
                 <a:pt x="0" y="0"/>
               </a:moveTo>
               <a:lnTo>
-                <a:pt x="300426" y="0"/>
+                <a:pt x="283937" y="0"/>
               </a:lnTo>
               <a:lnTo>
-                <a:pt x="300426" y="1144918"/>
+                <a:pt x="283937" y="1623119"/>
               </a:lnTo>
               <a:lnTo>
-                <a:pt x="600853" y="1144918"/>
+                <a:pt x="567875" y="1623119"/>
+              </a:lnTo>
+            </a:path>
+          </a:pathLst>
+        </a:custGeom>
+        <a:noFill/>
+        <a:ln w="12700" cap="flat" cmpd="sng" algn="ctr">
+          <a:solidFill>
+            <a:scrgbClr r="0" g="0" b="0"/>
+          </a:solidFill>
+          <a:prstDash val="dash"/>
+          <a:miter lim="800000"/>
+        </a:ln>
+        <a:effectLst/>
+      </dsp:spPr>
+      <dsp:style>
+        <a:lnRef idx="2">
+          <a:scrgbClr r="0" g="0" b="0"/>
+        </a:lnRef>
+        <a:fillRef idx="0">
+          <a:scrgbClr r="0" g="0" b="0"/>
+        </a:fillRef>
+        <a:effectRef idx="0">
+          <a:scrgbClr r="0" g="0" b="0"/>
+        </a:effectRef>
+        <a:fontRef idx="minor"/>
+      </dsp:style>
+      <dsp:txBody>
+        <a:bodyPr spcFirstLastPara="0" vert="horz" wrap="square" lIns="12700" tIns="0" rIns="12700" bIns="0" numCol="1" spcCol="1270" anchor="ctr" anchorCtr="0">
+          <a:noAutofit/>
+        </a:bodyPr>
+        <a:lstStyle/>
+        <a:p>
+          <a:pPr marL="0" lvl="0" indent="0" algn="ctr" defTabSz="889000">
+            <a:lnSpc>
+              <a:spcPct val="90000"/>
+            </a:lnSpc>
+            <a:spcBef>
+              <a:spcPct val="0"/>
+            </a:spcBef>
+            <a:spcAft>
+              <a:spcPct val="35000"/>
+            </a:spcAft>
+            <a:buNone/>
+          </a:pPr>
+          <a:endParaRPr lang="en-US" sz="2000" b="0" kern="1200">
+            <a:latin typeface="Arial" panose="020B0604020202020204" pitchFamily="34" charset="0"/>
+            <a:cs typeface="Arial" panose="020B0604020202020204" pitchFamily="34" charset="0"/>
+          </a:endParaRPr>
+        </a:p>
+      </dsp:txBody>
+      <dsp:txXfrm>
+        <a:off x="4737779" y="4129998"/>
+        <a:ext cx="85979" cy="85979"/>
+      </dsp:txXfrm>
+    </dsp:sp>
+    <dsp:sp modelId="{8B1D37C4-BE69-4E8F-8073-932B19B29946}">
+      <dsp:nvSpPr>
+        <dsp:cNvPr id="0" name=""/>
+        <dsp:cNvSpPr/>
+      </dsp:nvSpPr>
+      <dsp:spPr>
+        <a:xfrm>
+          <a:off x="4496831" y="3361428"/>
+          <a:ext cx="567875" cy="541039"/>
+        </a:xfrm>
+        <a:custGeom>
+          <a:avLst/>
+          <a:gdLst/>
+          <a:ahLst/>
+          <a:cxnLst/>
+          <a:rect l="0" t="0" r="0" b="0"/>
+          <a:pathLst>
+            <a:path>
+              <a:moveTo>
+                <a:pt x="0" y="0"/>
+              </a:moveTo>
+              <a:lnTo>
+                <a:pt x="283937" y="0"/>
+              </a:lnTo>
+              <a:lnTo>
+                <a:pt x="283937" y="541039"/>
+              </a:lnTo>
+              <a:lnTo>
+                <a:pt x="567875" y="541039"/>
+              </a:lnTo>
+            </a:path>
+          </a:pathLst>
+        </a:custGeom>
+        <a:noFill/>
+        <a:ln w="12700" cap="flat" cmpd="sng" algn="ctr">
+          <a:solidFill>
+            <a:scrgbClr r="0" g="0" b="0"/>
+          </a:solidFill>
+          <a:prstDash val="dash"/>
+          <a:miter lim="800000"/>
+        </a:ln>
+        <a:effectLst/>
+      </dsp:spPr>
+      <dsp:style>
+        <a:lnRef idx="2">
+          <a:scrgbClr r="0" g="0" b="0"/>
+        </a:lnRef>
+        <a:fillRef idx="0">
+          <a:scrgbClr r="0" g="0" b="0"/>
+        </a:fillRef>
+        <a:effectRef idx="0">
+          <a:scrgbClr r="0" g="0" b="0"/>
+        </a:effectRef>
+        <a:fontRef idx="minor"/>
+      </dsp:style>
+      <dsp:txBody>
+        <a:bodyPr spcFirstLastPara="0" vert="horz" wrap="square" lIns="12700" tIns="0" rIns="12700" bIns="0" numCol="1" spcCol="1270" anchor="ctr" anchorCtr="0">
+          <a:noAutofit/>
+        </a:bodyPr>
+        <a:lstStyle/>
+        <a:p>
+          <a:pPr marL="0" lvl="0" indent="0" algn="ctr" defTabSz="889000">
+            <a:lnSpc>
+              <a:spcPct val="90000"/>
+            </a:lnSpc>
+            <a:spcBef>
+              <a:spcPct val="0"/>
+            </a:spcBef>
+            <a:spcAft>
+              <a:spcPct val="35000"/>
+            </a:spcAft>
+            <a:buNone/>
+          </a:pPr>
+          <a:endParaRPr lang="en-US" sz="2000" b="0" kern="1200">
+            <a:latin typeface="Arial" panose="020B0604020202020204" pitchFamily="34" charset="0"/>
+            <a:cs typeface="Arial" panose="020B0604020202020204" pitchFamily="34" charset="0"/>
+          </a:endParaRPr>
+        </a:p>
+      </dsp:txBody>
+      <dsp:txXfrm>
+        <a:off x="4761160" y="3612340"/>
+        <a:ext cx="39217" cy="39217"/>
+      </dsp:txXfrm>
+    </dsp:sp>
+    <dsp:sp modelId="{46EA138D-EC26-4575-8A60-6B619CF0FFA4}">
+      <dsp:nvSpPr>
+        <dsp:cNvPr id="0" name=""/>
+        <dsp:cNvSpPr/>
+      </dsp:nvSpPr>
+      <dsp:spPr>
+        <a:xfrm>
+          <a:off x="4496831" y="2820389"/>
+          <a:ext cx="567875" cy="541039"/>
+        </a:xfrm>
+        <a:custGeom>
+          <a:avLst/>
+          <a:gdLst/>
+          <a:ahLst/>
+          <a:cxnLst/>
+          <a:rect l="0" t="0" r="0" b="0"/>
+          <a:pathLst>
+            <a:path>
+              <a:moveTo>
+                <a:pt x="0" y="541039"/>
+              </a:moveTo>
+              <a:lnTo>
+                <a:pt x="283937" y="541039"/>
+              </a:lnTo>
+              <a:lnTo>
+                <a:pt x="283937" y="0"/>
+              </a:lnTo>
+              <a:lnTo>
+                <a:pt x="567875" y="0"/>
+              </a:lnTo>
+            </a:path>
+          </a:pathLst>
+        </a:custGeom>
+        <a:noFill/>
+        <a:ln w="12700" cap="flat" cmpd="sng" algn="ctr">
+          <a:solidFill>
+            <a:scrgbClr r="0" g="0" b="0"/>
+          </a:solidFill>
+          <a:prstDash val="dash"/>
+          <a:miter lim="800000"/>
+        </a:ln>
+        <a:effectLst/>
+      </dsp:spPr>
+      <dsp:style>
+        <a:lnRef idx="2">
+          <a:scrgbClr r="0" g="0" b="0"/>
+        </a:lnRef>
+        <a:fillRef idx="0">
+          <a:scrgbClr r="0" g="0" b="0"/>
+        </a:fillRef>
+        <a:effectRef idx="0">
+          <a:scrgbClr r="0" g="0" b="0"/>
+        </a:effectRef>
+        <a:fontRef idx="minor"/>
+      </dsp:style>
+      <dsp:txBody>
+        <a:bodyPr spcFirstLastPara="0" vert="horz" wrap="square" lIns="12700" tIns="0" rIns="12700" bIns="0" numCol="1" spcCol="1270" anchor="ctr" anchorCtr="0">
+          <a:noAutofit/>
+        </a:bodyPr>
+        <a:lstStyle/>
+        <a:p>
+          <a:pPr marL="0" lvl="0" indent="0" algn="ctr" defTabSz="889000">
+            <a:lnSpc>
+              <a:spcPct val="90000"/>
+            </a:lnSpc>
+            <a:spcBef>
+              <a:spcPct val="0"/>
+            </a:spcBef>
+            <a:spcAft>
+              <a:spcPct val="35000"/>
+            </a:spcAft>
+            <a:buNone/>
+          </a:pPr>
+          <a:endParaRPr lang="en-US" sz="2000" b="0" kern="1200">
+            <a:latin typeface="Arial" panose="020B0604020202020204" pitchFamily="34" charset="0"/>
+            <a:cs typeface="Arial" panose="020B0604020202020204" pitchFamily="34" charset="0"/>
+          </a:endParaRPr>
+        </a:p>
+      </dsp:txBody>
+      <dsp:txXfrm>
+        <a:off x="4761160" y="3071300"/>
+        <a:ext cx="39217" cy="39217"/>
+      </dsp:txXfrm>
+    </dsp:sp>
+    <dsp:sp modelId="{5D3E1F1E-DE1B-42AF-BA46-55CB2B590D43}">
+      <dsp:nvSpPr>
+        <dsp:cNvPr id="0" name=""/>
+        <dsp:cNvSpPr/>
+      </dsp:nvSpPr>
+      <dsp:spPr>
+        <a:xfrm>
+          <a:off x="4496831" y="1738309"/>
+          <a:ext cx="567875" cy="1623119"/>
+        </a:xfrm>
+        <a:custGeom>
+          <a:avLst/>
+          <a:gdLst/>
+          <a:ahLst/>
+          <a:cxnLst/>
+          <a:rect l="0" t="0" r="0" b="0"/>
+          <a:pathLst>
+            <a:path>
+              <a:moveTo>
+                <a:pt x="0" y="1623119"/>
+              </a:moveTo>
+              <a:lnTo>
+                <a:pt x="283937" y="1623119"/>
+              </a:lnTo>
+              <a:lnTo>
+                <a:pt x="283937" y="0"/>
+              </a:lnTo>
+              <a:lnTo>
+                <a:pt x="567875" y="0"/>
+              </a:lnTo>
+            </a:path>
+          </a:pathLst>
+        </a:custGeom>
+        <a:noFill/>
+        <a:ln w="12700" cap="flat" cmpd="sng" algn="ctr">
+          <a:solidFill>
+            <a:scrgbClr r="0" g="0" b="0"/>
+          </a:solidFill>
+          <a:prstDash val="dash"/>
+          <a:miter lim="800000"/>
+        </a:ln>
+        <a:effectLst/>
+      </dsp:spPr>
+      <dsp:style>
+        <a:lnRef idx="2">
+          <a:scrgbClr r="0" g="0" b="0"/>
+        </a:lnRef>
+        <a:fillRef idx="0">
+          <a:scrgbClr r="0" g="0" b="0"/>
+        </a:fillRef>
+        <a:effectRef idx="0">
+          <a:scrgbClr r="0" g="0" b="0"/>
+        </a:effectRef>
+        <a:fontRef idx="minor"/>
+      </dsp:style>
+      <dsp:txBody>
+        <a:bodyPr spcFirstLastPara="0" vert="horz" wrap="square" lIns="12700" tIns="0" rIns="12700" bIns="0" numCol="1" spcCol="1270" anchor="ctr" anchorCtr="0">
+          <a:noAutofit/>
+        </a:bodyPr>
+        <a:lstStyle/>
+        <a:p>
+          <a:pPr marL="0" lvl="0" indent="0" algn="ctr" defTabSz="889000">
+            <a:lnSpc>
+              <a:spcPct val="90000"/>
+            </a:lnSpc>
+            <a:spcBef>
+              <a:spcPct val="0"/>
+            </a:spcBef>
+            <a:spcAft>
+              <a:spcPct val="35000"/>
+            </a:spcAft>
+            <a:buNone/>
+          </a:pPr>
+          <a:endParaRPr lang="en-US" sz="2000" b="0" kern="1200">
+            <a:latin typeface="Arial" panose="020B0604020202020204" pitchFamily="34" charset="0"/>
+            <a:cs typeface="Arial" panose="020B0604020202020204" pitchFamily="34" charset="0"/>
+          </a:endParaRPr>
+        </a:p>
+      </dsp:txBody>
+      <dsp:txXfrm>
+        <a:off x="4737779" y="2506879"/>
+        <a:ext cx="85979" cy="85979"/>
+      </dsp:txXfrm>
+    </dsp:sp>
+    <dsp:sp modelId="{34D9AAE3-5725-4E9F-BDDB-DEB9447AD4B3}">
+      <dsp:nvSpPr>
+        <dsp:cNvPr id="0" name=""/>
+        <dsp:cNvSpPr/>
+      </dsp:nvSpPr>
+      <dsp:spPr>
+        <a:xfrm>
+          <a:off x="1089579" y="2279349"/>
+          <a:ext cx="567875" cy="1082079"/>
+        </a:xfrm>
+        <a:custGeom>
+          <a:avLst/>
+          <a:gdLst/>
+          <a:ahLst/>
+          <a:cxnLst/>
+          <a:rect l="0" t="0" r="0" b="0"/>
+          <a:pathLst>
+            <a:path>
+              <a:moveTo>
+                <a:pt x="0" y="0"/>
+              </a:moveTo>
+              <a:lnTo>
+                <a:pt x="283937" y="0"/>
+              </a:lnTo>
+              <a:lnTo>
+                <a:pt x="283937" y="1082079"/>
+              </a:lnTo>
+              <a:lnTo>
+                <a:pt x="567875" y="1082079"/>
               </a:lnTo>
             </a:path>
           </a:pathLst>
@@ -1680,361 +2064,25 @@
             <a:buNone/>
           </a:pPr>
           <a:endParaRPr lang="en-US" sz="2000" b="0" kern="1200">
-            <a:latin typeface="Aharoni" panose="020B0604020202020204" pitchFamily="2" charset="-79"/>
-            <a:cs typeface="Aharoni" panose="020B0604020202020204" pitchFamily="2" charset="-79"/>
+            <a:latin typeface="Arial" panose="020B0604020202020204" pitchFamily="34" charset="0"/>
+            <a:cs typeface="Arial" panose="020B0604020202020204" pitchFamily="34" charset="0"/>
           </a:endParaRPr>
         </a:p>
       </dsp:txBody>
       <dsp:txXfrm>
-        <a:off x="1184950" y="3249467"/>
-        <a:ext cx="64650" cy="64650"/>
+        <a:off x="1342965" y="2789838"/>
+        <a:ext cx="61101" cy="61101"/>
       </dsp:txXfrm>
     </dsp:sp>
-    <dsp:sp modelId="{E47D70A8-9449-4BA9-81D4-07206E945891}">
+    <dsp:sp modelId="{8F8123F4-E80D-407E-B824-28C40A5675FD}">
       <dsp:nvSpPr>
         <dsp:cNvPr id="0" name=""/>
         <dsp:cNvSpPr/>
       </dsp:nvSpPr>
       <dsp:spPr>
         <a:xfrm>
-          <a:off x="4521967" y="2709333"/>
-          <a:ext cx="600853" cy="1717377"/>
-        </a:xfrm>
-        <a:custGeom>
-          <a:avLst/>
-          <a:gdLst/>
-          <a:ahLst/>
-          <a:cxnLst/>
-          <a:rect l="0" t="0" r="0" b="0"/>
-          <a:pathLst>
-            <a:path>
-              <a:moveTo>
-                <a:pt x="0" y="0"/>
-              </a:moveTo>
-              <a:lnTo>
-                <a:pt x="300426" y="0"/>
-              </a:lnTo>
-              <a:lnTo>
-                <a:pt x="300426" y="1717377"/>
-              </a:lnTo>
-              <a:lnTo>
-                <a:pt x="600853" y="1717377"/>
-              </a:lnTo>
-            </a:path>
-          </a:pathLst>
-        </a:custGeom>
-        <a:noFill/>
-        <a:ln w="12700" cap="flat" cmpd="sng" algn="ctr">
-          <a:solidFill>
-            <a:scrgbClr r="0" g="0" b="0"/>
-          </a:solidFill>
-          <a:prstDash val="dash"/>
-          <a:miter lim="800000"/>
-        </a:ln>
-        <a:effectLst/>
-      </dsp:spPr>
-      <dsp:style>
-        <a:lnRef idx="2">
-          <a:scrgbClr r="0" g="0" b="0"/>
-        </a:lnRef>
-        <a:fillRef idx="0">
-          <a:scrgbClr r="0" g="0" b="0"/>
-        </a:fillRef>
-        <a:effectRef idx="0">
-          <a:scrgbClr r="0" g="0" b="0"/>
-        </a:effectRef>
-        <a:fontRef idx="minor"/>
-      </dsp:style>
-      <dsp:txBody>
-        <a:bodyPr spcFirstLastPara="0" vert="horz" wrap="square" lIns="12700" tIns="0" rIns="12700" bIns="0" numCol="1" spcCol="1270" anchor="ctr" anchorCtr="0">
-          <a:noAutofit/>
-        </a:bodyPr>
-        <a:lstStyle/>
-        <a:p>
-          <a:pPr marL="0" lvl="0" indent="0" algn="ctr" defTabSz="889000">
-            <a:lnSpc>
-              <a:spcPct val="90000"/>
-            </a:lnSpc>
-            <a:spcBef>
-              <a:spcPct val="0"/>
-            </a:spcBef>
-            <a:spcAft>
-              <a:spcPct val="35000"/>
-            </a:spcAft>
-            <a:buNone/>
-          </a:pPr>
-          <a:endParaRPr lang="en-US" sz="2000" b="0" kern="1200">
-            <a:latin typeface="Aharoni" panose="020B0604020202020204" pitchFamily="2" charset="-79"/>
-            <a:cs typeface="Aharoni" panose="020B0604020202020204" pitchFamily="2" charset="-79"/>
-          </a:endParaRPr>
-        </a:p>
-      </dsp:txBody>
-      <dsp:txXfrm>
-        <a:off x="4776907" y="3522535"/>
-        <a:ext cx="90972" cy="90972"/>
-      </dsp:txXfrm>
-    </dsp:sp>
-    <dsp:sp modelId="{8B1D37C4-BE69-4E8F-8073-932B19B29946}">
-      <dsp:nvSpPr>
-        <dsp:cNvPr id="0" name=""/>
-        <dsp:cNvSpPr/>
-      </dsp:nvSpPr>
-      <dsp:spPr>
-        <a:xfrm>
-          <a:off x="4521967" y="2709333"/>
-          <a:ext cx="600853" cy="572459"/>
-        </a:xfrm>
-        <a:custGeom>
-          <a:avLst/>
-          <a:gdLst/>
-          <a:ahLst/>
-          <a:cxnLst/>
-          <a:rect l="0" t="0" r="0" b="0"/>
-          <a:pathLst>
-            <a:path>
-              <a:moveTo>
-                <a:pt x="0" y="0"/>
-              </a:moveTo>
-              <a:lnTo>
-                <a:pt x="300426" y="0"/>
-              </a:lnTo>
-              <a:lnTo>
-                <a:pt x="300426" y="572459"/>
-              </a:lnTo>
-              <a:lnTo>
-                <a:pt x="600853" y="572459"/>
-              </a:lnTo>
-            </a:path>
-          </a:pathLst>
-        </a:custGeom>
-        <a:noFill/>
-        <a:ln w="12700" cap="flat" cmpd="sng" algn="ctr">
-          <a:solidFill>
-            <a:scrgbClr r="0" g="0" b="0"/>
-          </a:solidFill>
-          <a:prstDash val="dash"/>
-          <a:miter lim="800000"/>
-        </a:ln>
-        <a:effectLst/>
-      </dsp:spPr>
-      <dsp:style>
-        <a:lnRef idx="2">
-          <a:scrgbClr r="0" g="0" b="0"/>
-        </a:lnRef>
-        <a:fillRef idx="0">
-          <a:scrgbClr r="0" g="0" b="0"/>
-        </a:fillRef>
-        <a:effectRef idx="0">
-          <a:scrgbClr r="0" g="0" b="0"/>
-        </a:effectRef>
-        <a:fontRef idx="minor"/>
-      </dsp:style>
-      <dsp:txBody>
-        <a:bodyPr spcFirstLastPara="0" vert="horz" wrap="square" lIns="12700" tIns="0" rIns="12700" bIns="0" numCol="1" spcCol="1270" anchor="ctr" anchorCtr="0">
-          <a:noAutofit/>
-        </a:bodyPr>
-        <a:lstStyle/>
-        <a:p>
-          <a:pPr marL="0" lvl="0" indent="0" algn="ctr" defTabSz="889000">
-            <a:lnSpc>
-              <a:spcPct val="90000"/>
-            </a:lnSpc>
-            <a:spcBef>
-              <a:spcPct val="0"/>
-            </a:spcBef>
-            <a:spcAft>
-              <a:spcPct val="35000"/>
-            </a:spcAft>
-            <a:buNone/>
-          </a:pPr>
-          <a:endParaRPr lang="en-US" sz="2000" b="0" kern="1200">
-            <a:latin typeface="Aharoni" panose="020B0604020202020204" pitchFamily="2" charset="-79"/>
-            <a:cs typeface="Aharoni" panose="020B0604020202020204" pitchFamily="2" charset="-79"/>
-          </a:endParaRPr>
-        </a:p>
-      </dsp:txBody>
-      <dsp:txXfrm>
-        <a:off x="4801646" y="2974815"/>
-        <a:ext cx="41494" cy="41494"/>
-      </dsp:txXfrm>
-    </dsp:sp>
-    <dsp:sp modelId="{46EA138D-EC26-4575-8A60-6B619CF0FFA4}">
-      <dsp:nvSpPr>
-        <dsp:cNvPr id="0" name=""/>
-        <dsp:cNvSpPr/>
-      </dsp:nvSpPr>
-      <dsp:spPr>
-        <a:xfrm>
-          <a:off x="4521967" y="2136874"/>
-          <a:ext cx="600853" cy="572459"/>
-        </a:xfrm>
-        <a:custGeom>
-          <a:avLst/>
-          <a:gdLst/>
-          <a:ahLst/>
-          <a:cxnLst/>
-          <a:rect l="0" t="0" r="0" b="0"/>
-          <a:pathLst>
-            <a:path>
-              <a:moveTo>
-                <a:pt x="0" y="572459"/>
-              </a:moveTo>
-              <a:lnTo>
-                <a:pt x="300426" y="572459"/>
-              </a:lnTo>
-              <a:lnTo>
-                <a:pt x="300426" y="0"/>
-              </a:lnTo>
-              <a:lnTo>
-                <a:pt x="600853" y="0"/>
-              </a:lnTo>
-            </a:path>
-          </a:pathLst>
-        </a:custGeom>
-        <a:noFill/>
-        <a:ln w="12700" cap="flat" cmpd="sng" algn="ctr">
-          <a:solidFill>
-            <a:scrgbClr r="0" g="0" b="0"/>
-          </a:solidFill>
-          <a:prstDash val="dash"/>
-          <a:miter lim="800000"/>
-        </a:ln>
-        <a:effectLst/>
-      </dsp:spPr>
-      <dsp:style>
-        <a:lnRef idx="2">
-          <a:scrgbClr r="0" g="0" b="0"/>
-        </a:lnRef>
-        <a:fillRef idx="0">
-          <a:scrgbClr r="0" g="0" b="0"/>
-        </a:fillRef>
-        <a:effectRef idx="0">
-          <a:scrgbClr r="0" g="0" b="0"/>
-        </a:effectRef>
-        <a:fontRef idx="minor"/>
-      </dsp:style>
-      <dsp:txBody>
-        <a:bodyPr spcFirstLastPara="0" vert="horz" wrap="square" lIns="12700" tIns="0" rIns="12700" bIns="0" numCol="1" spcCol="1270" anchor="ctr" anchorCtr="0">
-          <a:noAutofit/>
-        </a:bodyPr>
-        <a:lstStyle/>
-        <a:p>
-          <a:pPr marL="0" lvl="0" indent="0" algn="ctr" defTabSz="889000">
-            <a:lnSpc>
-              <a:spcPct val="90000"/>
-            </a:lnSpc>
-            <a:spcBef>
-              <a:spcPct val="0"/>
-            </a:spcBef>
-            <a:spcAft>
-              <a:spcPct val="35000"/>
-            </a:spcAft>
-            <a:buNone/>
-          </a:pPr>
-          <a:endParaRPr lang="en-US" sz="2000" b="0" kern="1200">
-            <a:latin typeface="Aharoni" panose="020B0604020202020204" pitchFamily="2" charset="-79"/>
-            <a:cs typeface="Aharoni" panose="020B0604020202020204" pitchFamily="2" charset="-79"/>
-          </a:endParaRPr>
-        </a:p>
-      </dsp:txBody>
-      <dsp:txXfrm>
-        <a:off x="4801646" y="2402356"/>
-        <a:ext cx="41494" cy="41494"/>
-      </dsp:txXfrm>
-    </dsp:sp>
-    <dsp:sp modelId="{5D3E1F1E-DE1B-42AF-BA46-55CB2B590D43}">
-      <dsp:nvSpPr>
-        <dsp:cNvPr id="0" name=""/>
-        <dsp:cNvSpPr/>
-      </dsp:nvSpPr>
-      <dsp:spPr>
-        <a:xfrm>
-          <a:off x="4521967" y="991956"/>
-          <a:ext cx="600853" cy="1717377"/>
-        </a:xfrm>
-        <a:custGeom>
-          <a:avLst/>
-          <a:gdLst/>
-          <a:ahLst/>
-          <a:cxnLst/>
-          <a:rect l="0" t="0" r="0" b="0"/>
-          <a:pathLst>
-            <a:path>
-              <a:moveTo>
-                <a:pt x="0" y="1717377"/>
-              </a:moveTo>
-              <a:lnTo>
-                <a:pt x="300426" y="1717377"/>
-              </a:lnTo>
-              <a:lnTo>
-                <a:pt x="300426" y="0"/>
-              </a:lnTo>
-              <a:lnTo>
-                <a:pt x="600853" y="0"/>
-              </a:lnTo>
-            </a:path>
-          </a:pathLst>
-        </a:custGeom>
-        <a:noFill/>
-        <a:ln w="12700" cap="flat" cmpd="sng" algn="ctr">
-          <a:solidFill>
-            <a:scrgbClr r="0" g="0" b="0"/>
-          </a:solidFill>
-          <a:prstDash val="dash"/>
-          <a:miter lim="800000"/>
-        </a:ln>
-        <a:effectLst/>
-      </dsp:spPr>
-      <dsp:style>
-        <a:lnRef idx="2">
-          <a:scrgbClr r="0" g="0" b="0"/>
-        </a:lnRef>
-        <a:fillRef idx="0">
-          <a:scrgbClr r="0" g="0" b="0"/>
-        </a:fillRef>
-        <a:effectRef idx="0">
-          <a:scrgbClr r="0" g="0" b="0"/>
-        </a:effectRef>
-        <a:fontRef idx="minor"/>
-      </dsp:style>
-      <dsp:txBody>
-        <a:bodyPr spcFirstLastPara="0" vert="horz" wrap="square" lIns="12700" tIns="0" rIns="12700" bIns="0" numCol="1" spcCol="1270" anchor="ctr" anchorCtr="0">
-          <a:noAutofit/>
-        </a:bodyPr>
-        <a:lstStyle/>
-        <a:p>
-          <a:pPr marL="0" lvl="0" indent="0" algn="ctr" defTabSz="889000">
-            <a:lnSpc>
-              <a:spcPct val="90000"/>
-            </a:lnSpc>
-            <a:spcBef>
-              <a:spcPct val="0"/>
-            </a:spcBef>
-            <a:spcAft>
-              <a:spcPct val="35000"/>
-            </a:spcAft>
-            <a:buNone/>
-          </a:pPr>
-          <a:endParaRPr lang="en-US" sz="2000" b="0" kern="1200">
-            <a:latin typeface="Aharoni" panose="020B0604020202020204" pitchFamily="2" charset="-79"/>
-            <a:cs typeface="Aharoni" panose="020B0604020202020204" pitchFamily="2" charset="-79"/>
-          </a:endParaRPr>
-        </a:p>
-      </dsp:txBody>
-      <dsp:txXfrm>
-        <a:off x="4776907" y="1805158"/>
-        <a:ext cx="90972" cy="90972"/>
-      </dsp:txXfrm>
-    </dsp:sp>
-    <dsp:sp modelId="{34D9AAE3-5725-4E9F-BDDB-DEB9447AD4B3}">
-      <dsp:nvSpPr>
-        <dsp:cNvPr id="0" name=""/>
-        <dsp:cNvSpPr/>
-      </dsp:nvSpPr>
-      <dsp:spPr>
-        <a:xfrm>
-          <a:off x="916848" y="2663613"/>
-          <a:ext cx="600853" cy="91440"/>
+          <a:off x="1089579" y="2233629"/>
+          <a:ext cx="567875" cy="91440"/>
         </a:xfrm>
         <a:custGeom>
           <a:avLst/>
@@ -2048,7 +2096,7 @@
                 <a:pt x="0" y="45720"/>
               </a:moveTo>
               <a:lnTo>
-                <a:pt x="600853" y="45720"/>
+                <a:pt x="567875" y="45720"/>
               </a:lnTo>
             </a:path>
           </a:pathLst>
@@ -2099,25 +2147,25 @@
             <a:buNone/>
           </a:pPr>
           <a:endParaRPr lang="en-US" sz="2000" b="0" kern="1200">
-            <a:latin typeface="Aharoni" panose="020B0604020202020204" pitchFamily="2" charset="-79"/>
-            <a:cs typeface="Aharoni" panose="020B0604020202020204" pitchFamily="2" charset="-79"/>
+            <a:latin typeface="Arial" panose="020B0604020202020204" pitchFamily="34" charset="0"/>
+            <a:cs typeface="Arial" panose="020B0604020202020204" pitchFamily="34" charset="0"/>
           </a:endParaRPr>
         </a:p>
       </dsp:txBody>
       <dsp:txXfrm>
-        <a:off x="1202253" y="2694312"/>
-        <a:ext cx="30042" cy="30042"/>
+        <a:off x="1359320" y="2265152"/>
+        <a:ext cx="28393" cy="28393"/>
       </dsp:txXfrm>
     </dsp:sp>
-    <dsp:sp modelId="{8F8123F4-E80D-407E-B824-28C40A5675FD}">
+    <dsp:sp modelId="{452CAEC8-30FA-4E4A-A0CD-B145BF3AF42F}">
       <dsp:nvSpPr>
         <dsp:cNvPr id="0" name=""/>
         <dsp:cNvSpPr/>
       </dsp:nvSpPr>
       <dsp:spPr>
         <a:xfrm>
-          <a:off x="916848" y="1564415"/>
-          <a:ext cx="600853" cy="1144918"/>
+          <a:off x="1089579" y="1197269"/>
+          <a:ext cx="567875" cy="1082079"/>
         </a:xfrm>
         <a:custGeom>
           <a:avLst/>
@@ -2128,16 +2176,16 @@
           <a:pathLst>
             <a:path>
               <a:moveTo>
-                <a:pt x="0" y="1144918"/>
+                <a:pt x="0" y="1082079"/>
               </a:moveTo>
               <a:lnTo>
-                <a:pt x="300426" y="1144918"/>
+                <a:pt x="283937" y="1082079"/>
               </a:lnTo>
               <a:lnTo>
-                <a:pt x="300426" y="0"/>
+                <a:pt x="283937" y="0"/>
               </a:lnTo>
               <a:lnTo>
-                <a:pt x="600853" y="0"/>
+                <a:pt x="567875" y="0"/>
               </a:lnTo>
             </a:path>
           </a:pathLst>
@@ -2188,14 +2236,14 @@
             <a:buNone/>
           </a:pPr>
           <a:endParaRPr lang="en-US" sz="2000" b="0" kern="1200">
-            <a:latin typeface="Aharoni" panose="020B0604020202020204" pitchFamily="2" charset="-79"/>
-            <a:cs typeface="Aharoni" panose="020B0604020202020204" pitchFamily="2" charset="-79"/>
+            <a:latin typeface="Arial" panose="020B0604020202020204" pitchFamily="34" charset="0"/>
+            <a:cs typeface="Arial" panose="020B0604020202020204" pitchFamily="34" charset="0"/>
           </a:endParaRPr>
         </a:p>
       </dsp:txBody>
       <dsp:txXfrm>
-        <a:off x="1184950" y="2104549"/>
-        <a:ext cx="64650" cy="64650"/>
+        <a:off x="1342965" y="1707758"/>
+        <a:ext cx="61101" cy="61101"/>
       </dsp:txXfrm>
     </dsp:sp>
     <dsp:sp modelId="{62D217EF-F3EF-442A-9728-0F6250A80547}">
@@ -2205,8 +2253,8 @@
       </dsp:nvSpPr>
       <dsp:spPr>
         <a:xfrm rot="16200000">
-          <a:off x="-1951473" y="2251366"/>
-          <a:ext cx="4820708" cy="915934"/>
+          <a:off x="-1621315" y="1846517"/>
+          <a:ext cx="4556125" cy="865663"/>
         </a:xfrm>
         <a:prstGeom prst="rect">
           <a:avLst/>
@@ -2294,16 +2342,149 @@
           </a:pPr>
           <a:r>
             <a:rPr lang="en-US" sz="2000" b="0" kern="1200" dirty="0">
-              <a:latin typeface="Aharoni" panose="020B0604020202020204" pitchFamily="2" charset="-79"/>
-              <a:cs typeface="Aharoni" panose="020B0604020202020204" pitchFamily="2" charset="-79"/>
+              <a:latin typeface="Arial" panose="020B0604020202020204" pitchFamily="34" charset="0"/>
+              <a:cs typeface="Arial" panose="020B0604020202020204" pitchFamily="34" charset="0"/>
             </a:rPr>
             <a:t>RUNTIME</a:t>
           </a:r>
         </a:p>
       </dsp:txBody>
       <dsp:txXfrm>
-        <a:off x="-1951473" y="2251366"/>
-        <a:ext cx="4820708" cy="915934"/>
+        <a:off x="-1621315" y="1846517"/>
+        <a:ext cx="4556125" cy="865663"/>
+      </dsp:txXfrm>
+    </dsp:sp>
+    <dsp:sp modelId="{8BFE763E-1F61-43EB-86C6-6758D7B275C0}">
+      <dsp:nvSpPr>
+        <dsp:cNvPr id="0" name=""/>
+        <dsp:cNvSpPr/>
+      </dsp:nvSpPr>
+      <dsp:spPr>
+        <a:xfrm>
+          <a:off x="1657454" y="764437"/>
+          <a:ext cx="2839377" cy="865663"/>
+        </a:xfrm>
+        <a:prstGeom prst="rect">
+          <a:avLst/>
+        </a:prstGeom>
+        <a:gradFill rotWithShape="0">
+          <a:gsLst>
+            <a:gs pos="0">
+              <a:schemeClr val="accent4">
+                <a:hueOff val="0"/>
+                <a:satOff val="0"/>
+                <a:lumOff val="0"/>
+                <a:alphaOff val="0"/>
+                <a:satMod val="103000"/>
+                <a:lumMod val="102000"/>
+                <a:tint val="94000"/>
+              </a:schemeClr>
+            </a:gs>
+            <a:gs pos="50000">
+              <a:schemeClr val="accent4">
+                <a:hueOff val="0"/>
+                <a:satOff val="0"/>
+                <a:lumOff val="0"/>
+                <a:alphaOff val="0"/>
+                <a:satMod val="110000"/>
+                <a:lumMod val="100000"/>
+                <a:shade val="100000"/>
+              </a:schemeClr>
+            </a:gs>
+            <a:gs pos="100000">
+              <a:schemeClr val="accent4">
+                <a:hueOff val="0"/>
+                <a:satOff val="0"/>
+                <a:lumOff val="0"/>
+                <a:alphaOff val="0"/>
+                <a:lumMod val="99000"/>
+                <a:satMod val="120000"/>
+                <a:shade val="78000"/>
+              </a:schemeClr>
+            </a:gs>
+          </a:gsLst>
+          <a:lin ang="5400000" scaled="0"/>
+        </a:gradFill>
+        <a:ln>
+          <a:noFill/>
+        </a:ln>
+        <a:effectLst>
+          <a:outerShdw blurRad="57150" dist="19050" dir="5400000" algn="ctr" rotWithShape="0">
+            <a:srgbClr val="000000">
+              <a:alpha val="63000"/>
+            </a:srgbClr>
+          </a:outerShdw>
+        </a:effectLst>
+      </dsp:spPr>
+      <dsp:style>
+        <a:lnRef idx="0">
+          <a:scrgbClr r="0" g="0" b="0"/>
+        </a:lnRef>
+        <a:fillRef idx="3">
+          <a:scrgbClr r="0" g="0" b="0"/>
+        </a:fillRef>
+        <a:effectRef idx="3">
+          <a:scrgbClr r="0" g="0" b="0"/>
+        </a:effectRef>
+        <a:fontRef idx="minor">
+          <a:schemeClr val="lt1"/>
+        </a:fontRef>
+      </dsp:style>
+      <dsp:txBody>
+        <a:bodyPr spcFirstLastPara="0" vert="horz" wrap="square" lIns="12700" tIns="12700" rIns="12700" bIns="12700" numCol="1" spcCol="1270" anchor="ctr" anchorCtr="0">
+          <a:noAutofit/>
+        </a:bodyPr>
+        <a:lstStyle/>
+        <a:p>
+          <a:pPr marL="0" lvl="0" indent="0" algn="ctr" defTabSz="889000">
+            <a:lnSpc>
+              <a:spcPct val="90000"/>
+            </a:lnSpc>
+            <a:spcBef>
+              <a:spcPct val="0"/>
+            </a:spcBef>
+            <a:spcAft>
+              <a:spcPct val="35000"/>
+            </a:spcAft>
+            <a:buNone/>
+          </a:pPr>
+          <a:r>
+            <a:rPr lang="en-US" sz="2000" b="0" kern="1200" dirty="0" err="1">
+              <a:latin typeface="Arial" panose="020B0604020202020204" pitchFamily="34" charset="0"/>
+              <a:cs typeface="Arial" panose="020B0604020202020204" pitchFamily="34" charset="0"/>
+            </a:rPr>
+            <a:t>RuntimeConfig</a:t>
+          </a:r>
+          <a:endParaRPr lang="en-US" sz="2000" b="0" kern="1200" dirty="0">
+            <a:latin typeface="Arial" panose="020B0604020202020204" pitchFamily="34" charset="0"/>
+            <a:cs typeface="Arial" panose="020B0604020202020204" pitchFamily="34" charset="0"/>
+          </a:endParaRPr>
+        </a:p>
+        <a:p>
+          <a:pPr marL="0" lvl="0" indent="0" algn="ctr" defTabSz="889000">
+            <a:lnSpc>
+              <a:spcPct val="90000"/>
+            </a:lnSpc>
+            <a:spcBef>
+              <a:spcPct val="0"/>
+            </a:spcBef>
+            <a:spcAft>
+              <a:spcPct val="35000"/>
+            </a:spcAft>
+            <a:buNone/>
+          </a:pPr>
+          <a:r>
+            <a:rPr lang="en-US" sz="1200" b="0" kern="1200" dirty="0">
+              <a:latin typeface="Arial" panose="020B0604020202020204" pitchFamily="34" charset="0"/>
+              <a:cs typeface="Arial" panose="020B0604020202020204" pitchFamily="34" charset="0"/>
+            </a:rPr>
+            <a:t>User customizations</a:t>
+          </a:r>
+        </a:p>
+      </dsp:txBody>
+      <dsp:txXfrm>
+        <a:off x="1657454" y="764437"/>
+        <a:ext cx="2839377" cy="865663"/>
       </dsp:txXfrm>
     </dsp:sp>
     <dsp:sp modelId="{576BC15B-169B-4BA9-BA1B-CA768D797C57}">
@@ -2313,8 +2494,8 @@
       </dsp:nvSpPr>
       <dsp:spPr>
         <a:xfrm>
-          <a:off x="1517701" y="1106447"/>
-          <a:ext cx="3004265" cy="915934"/>
+          <a:off x="1657454" y="1846517"/>
+          <a:ext cx="2839377" cy="865663"/>
         </a:xfrm>
         <a:prstGeom prst="rect">
           <a:avLst/>
@@ -2402,16 +2583,62 @@
           </a:pPr>
           <a:r>
             <a:rPr lang="en-US" sz="2000" b="0" kern="1200" dirty="0">
-              <a:latin typeface="Aharoni" panose="020B0604020202020204" pitchFamily="2" charset="-79"/>
-              <a:cs typeface="Aharoni" panose="020B0604020202020204" pitchFamily="2" charset="-79"/>
+              <a:latin typeface="Arial" panose="020B0604020202020204" pitchFamily="34" charset="0"/>
+              <a:cs typeface="Arial" panose="020B0604020202020204" pitchFamily="34" charset="0"/>
             </a:rPr>
             <a:t>Subject</a:t>
           </a:r>
         </a:p>
+        <a:p>
+          <a:pPr marL="0" lvl="0" indent="0" algn="ctr" defTabSz="889000">
+            <a:lnSpc>
+              <a:spcPct val="90000"/>
+            </a:lnSpc>
+            <a:spcBef>
+              <a:spcPct val="0"/>
+            </a:spcBef>
+            <a:spcAft>
+              <a:spcPct val="35000"/>
+            </a:spcAft>
+            <a:buNone/>
+          </a:pPr>
+          <a:r>
+            <a:rPr lang="en-US" sz="1200" b="0" kern="1200" dirty="0">
+              <a:latin typeface="Arial" panose="020B0604020202020204" pitchFamily="34" charset="0"/>
+              <a:cs typeface="Arial" panose="020B0604020202020204" pitchFamily="34" charset="0"/>
+            </a:rPr>
+            <a:t>Identifying &amp; descriptive information</a:t>
+          </a:r>
+        </a:p>
+        <a:p>
+          <a:pPr marL="0" lvl="0" indent="0" algn="ctr" defTabSz="889000">
+            <a:lnSpc>
+              <a:spcPct val="90000"/>
+            </a:lnSpc>
+            <a:spcBef>
+              <a:spcPct val="0"/>
+            </a:spcBef>
+            <a:spcAft>
+              <a:spcPct val="35000"/>
+            </a:spcAft>
+            <a:buNone/>
+          </a:pPr>
+          <a:r>
+            <a:rPr lang="en-US" sz="1200" b="0" kern="1200" dirty="0">
+              <a:latin typeface="Arial" panose="020B0604020202020204" pitchFamily="34" charset="0"/>
+              <a:cs typeface="Arial" panose="020B0604020202020204" pitchFamily="34" charset="0"/>
+            </a:rPr>
+            <a:t>Subject-specific protocols</a:t>
+          </a:r>
+          <a:endParaRPr lang="en-US" sz="2000" b="0" kern="1200" dirty="0">
+            <a:latin typeface="Arial" panose="020B0604020202020204" pitchFamily="34" charset="0"/>
+            <a:cs typeface="Arial" panose="020B0604020202020204" pitchFamily="34" charset="0"/>
+          </a:endParaRPr>
+        </a:p>
       </dsp:txBody>
       <dsp:txXfrm>
-        <a:off x="1517701" y="1106447"/>
-        <a:ext cx="3004265" cy="915934"/>
+        <a:off x="1657454" y="1846517"/>
+        <a:ext cx="2839377" cy="865663"/>
       </dsp:txXfrm>
     </dsp:sp>
     <dsp:sp modelId="{23C82D94-A270-4AB9-8A2D-D31F996A4AF1}">
@@ -2421,8 +2648,8 @@
       </dsp:nvSpPr>
       <dsp:spPr>
         <a:xfrm>
-          <a:off x="1517701" y="2251366"/>
-          <a:ext cx="3004265" cy="915934"/>
+          <a:off x="1657454" y="2928597"/>
+          <a:ext cx="2839377" cy="865663"/>
         </a:xfrm>
         <a:prstGeom prst="rect">
           <a:avLst/>
@@ -2510,99 +2737,12 @@
           </a:pPr>
           <a:r>
             <a:rPr lang="en-US" sz="2000" b="0" kern="1200" dirty="0">
-              <a:latin typeface="Aharoni" panose="020B0604020202020204" pitchFamily="2" charset="-79"/>
-              <a:cs typeface="Aharoni" panose="020B0604020202020204" pitchFamily="2" charset="-79"/>
+              <a:latin typeface="Arial" panose="020B0604020202020204" pitchFamily="34" charset="0"/>
+              <a:cs typeface="Arial" panose="020B0604020202020204" pitchFamily="34" charset="0"/>
             </a:rPr>
             <a:t>Hardware</a:t>
           </a:r>
         </a:p>
-      </dsp:txBody>
-      <dsp:txXfrm>
-        <a:off x="1517701" y="2251366"/>
-        <a:ext cx="3004265" cy="915934"/>
-      </dsp:txXfrm>
-    </dsp:sp>
-    <dsp:sp modelId="{C63E3B85-DB6F-4358-AD04-C7E79D27D0F9}">
-      <dsp:nvSpPr>
-        <dsp:cNvPr id="0" name=""/>
-        <dsp:cNvSpPr/>
-      </dsp:nvSpPr>
-      <dsp:spPr>
-        <a:xfrm>
-          <a:off x="5122820" y="533988"/>
-          <a:ext cx="3004265" cy="915934"/>
-        </a:xfrm>
-        <a:prstGeom prst="rect">
-          <a:avLst/>
-        </a:prstGeom>
-        <a:gradFill rotWithShape="0">
-          <a:gsLst>
-            <a:gs pos="0">
-              <a:schemeClr val="accent5">
-                <a:hueOff val="0"/>
-                <a:satOff val="0"/>
-                <a:lumOff val="0"/>
-                <a:alphaOff val="0"/>
-                <a:satMod val="103000"/>
-                <a:lumMod val="102000"/>
-                <a:tint val="94000"/>
-              </a:schemeClr>
-            </a:gs>
-            <a:gs pos="50000">
-              <a:schemeClr val="accent5">
-                <a:hueOff val="0"/>
-                <a:satOff val="0"/>
-                <a:lumOff val="0"/>
-                <a:alphaOff val="0"/>
-                <a:satMod val="110000"/>
-                <a:lumMod val="100000"/>
-                <a:shade val="100000"/>
-              </a:schemeClr>
-            </a:gs>
-            <a:gs pos="100000">
-              <a:schemeClr val="accent5">
-                <a:hueOff val="0"/>
-                <a:satOff val="0"/>
-                <a:lumOff val="0"/>
-                <a:alphaOff val="0"/>
-                <a:lumMod val="99000"/>
-                <a:satMod val="120000"/>
-                <a:shade val="78000"/>
-              </a:schemeClr>
-            </a:gs>
-          </a:gsLst>
-          <a:lin ang="5400000" scaled="0"/>
-        </a:gradFill>
-        <a:ln>
-          <a:noFill/>
-        </a:ln>
-        <a:effectLst>
-          <a:outerShdw blurRad="57150" dist="19050" dir="5400000" algn="ctr" rotWithShape="0">
-            <a:srgbClr val="000000">
-              <a:alpha val="63000"/>
-            </a:srgbClr>
-          </a:outerShdw>
-        </a:effectLst>
-      </dsp:spPr>
-      <dsp:style>
-        <a:lnRef idx="0">
-          <a:scrgbClr r="0" g="0" b="0"/>
-        </a:lnRef>
-        <a:fillRef idx="3">
-          <a:scrgbClr r="0" g="0" b="0"/>
-        </a:fillRef>
-        <a:effectRef idx="3">
-          <a:scrgbClr r="0" g="0" b="0"/>
-        </a:effectRef>
-        <a:fontRef idx="minor">
-          <a:schemeClr val="lt1"/>
-        </a:fontRef>
-      </dsp:style>
-      <dsp:txBody>
-        <a:bodyPr spcFirstLastPara="0" vert="horz" wrap="square" lIns="12700" tIns="12700" rIns="12700" bIns="12700" numCol="1" spcCol="1270" anchor="ctr" anchorCtr="0">
-          <a:noAutofit/>
-        </a:bodyPr>
-        <a:lstStyle/>
         <a:p>
           <a:pPr marL="0" lvl="0" indent="0" algn="ctr" defTabSz="889000">
             <a:lnSpc>
@@ -2617,32 +2757,28 @@
             <a:buNone/>
           </a:pPr>
           <a:r>
-            <a:rPr lang="en-US" sz="2000" b="0" kern="1200">
-              <a:latin typeface="Aharoni" panose="020B0604020202020204" pitchFamily="2" charset="-79"/>
-              <a:cs typeface="Aharoni" panose="020B0604020202020204" pitchFamily="2" charset="-79"/>
+            <a:rPr lang="en-US" sz="1200" b="0" kern="1200" dirty="0">
+              <a:latin typeface="Arial" panose="020B0604020202020204" pitchFamily="34" charset="0"/>
+              <a:cs typeface="Arial" panose="020B0604020202020204" pitchFamily="34" charset="0"/>
             </a:rPr>
-            <a:t>TDTActiveX</a:t>
+            <a:t>Abstraction layer</a:t>
           </a:r>
-          <a:endParaRPr lang="en-US" sz="2000" b="0" kern="1200" dirty="0">
-            <a:latin typeface="Aharoni" panose="020B0604020202020204" pitchFamily="2" charset="-79"/>
-            <a:cs typeface="Aharoni" panose="020B0604020202020204" pitchFamily="2" charset="-79"/>
-          </a:endParaRPr>
         </a:p>
       </dsp:txBody>
       <dsp:txXfrm>
-        <a:off x="5122820" y="533988"/>
-        <a:ext cx="3004265" cy="915934"/>
+        <a:off x="1657454" y="2928597"/>
+        <a:ext cx="2839377" cy="865663"/>
       </dsp:txXfrm>
     </dsp:sp>
-    <dsp:sp modelId="{CC83036E-2DF9-4076-BD5A-4FFFC4C489CB}">
+    <dsp:sp modelId="{C63E3B85-DB6F-4358-AD04-C7E79D27D0F9}">
       <dsp:nvSpPr>
         <dsp:cNvPr id="0" name=""/>
         <dsp:cNvSpPr/>
       </dsp:nvSpPr>
       <dsp:spPr>
         <a:xfrm>
-          <a:off x="5122820" y="1678907"/>
-          <a:ext cx="3004265" cy="915934"/>
+          <a:off x="5064707" y="1305477"/>
+          <a:ext cx="2839377" cy="865663"/>
         </a:xfrm>
         <a:prstGeom prst="rect">
           <a:avLst/>
@@ -2730,31 +2866,31 @@
           </a:pPr>
           <a:r>
             <a:rPr lang="en-US" sz="2000" b="0" kern="1200" dirty="0" err="1">
-              <a:latin typeface="Aharoni" panose="020B0604020202020204" pitchFamily="2" charset="-79"/>
-              <a:cs typeface="Aharoni" panose="020B0604020202020204" pitchFamily="2" charset="-79"/>
+              <a:latin typeface="Arial" panose="020B0604020202020204" pitchFamily="34" charset="0"/>
+              <a:cs typeface="Arial" panose="020B0604020202020204" pitchFamily="34" charset="0"/>
             </a:rPr>
-            <a:t>TDTSynapse</a:t>
+            <a:t>TDTActiveX</a:t>
           </a:r>
           <a:endParaRPr lang="en-US" sz="2000" b="0" kern="1200" dirty="0">
-            <a:latin typeface="Aharoni" panose="020B0604020202020204" pitchFamily="2" charset="-79"/>
-            <a:cs typeface="Aharoni" panose="020B0604020202020204" pitchFamily="2" charset="-79"/>
+            <a:latin typeface="Arial" panose="020B0604020202020204" pitchFamily="34" charset="0"/>
+            <a:cs typeface="Arial" panose="020B0604020202020204" pitchFamily="34" charset="0"/>
           </a:endParaRPr>
         </a:p>
       </dsp:txBody>
       <dsp:txXfrm>
-        <a:off x="5122820" y="1678907"/>
-        <a:ext cx="3004265" cy="915934"/>
+        <a:off x="5064707" y="1305477"/>
+        <a:ext cx="2839377" cy="865663"/>
       </dsp:txXfrm>
     </dsp:sp>
-    <dsp:sp modelId="{599E43A8-1BED-49D5-BE29-4DA6FD83C36B}">
+    <dsp:sp modelId="{CC83036E-2DF9-4076-BD5A-4FFFC4C489CB}">
       <dsp:nvSpPr>
         <dsp:cNvPr id="0" name=""/>
         <dsp:cNvSpPr/>
       </dsp:nvSpPr>
       <dsp:spPr>
         <a:xfrm>
-          <a:off x="5122820" y="2823825"/>
-          <a:ext cx="3004265" cy="915934"/>
+          <a:off x="5064707" y="2387557"/>
+          <a:ext cx="2839377" cy="865663"/>
         </a:xfrm>
         <a:prstGeom prst="rect">
           <a:avLst/>
@@ -2842,20 +2978,132 @@
           </a:pPr>
           <a:r>
             <a:rPr lang="en-US" sz="2000" b="0" kern="1200" dirty="0" err="1">
-              <a:latin typeface="Aharoni" panose="020B0604020202020204" pitchFamily="2" charset="-79"/>
-              <a:cs typeface="Aharoni" panose="020B0604020202020204" pitchFamily="2" charset="-79"/>
+              <a:latin typeface="Arial" panose="020B0604020202020204" pitchFamily="34" charset="0"/>
+              <a:cs typeface="Arial" panose="020B0604020202020204" pitchFamily="34" charset="0"/>
+            </a:rPr>
+            <a:t>TDTSynapse</a:t>
+          </a:r>
+          <a:endParaRPr lang="en-US" sz="2000" b="0" kern="1200" dirty="0">
+            <a:latin typeface="Arial" panose="020B0604020202020204" pitchFamily="34" charset="0"/>
+            <a:cs typeface="Arial" panose="020B0604020202020204" pitchFamily="34" charset="0"/>
+          </a:endParaRPr>
+        </a:p>
+      </dsp:txBody>
+      <dsp:txXfrm>
+        <a:off x="5064707" y="2387557"/>
+        <a:ext cx="2839377" cy="865663"/>
+      </dsp:txXfrm>
+    </dsp:sp>
+    <dsp:sp modelId="{599E43A8-1BED-49D5-BE29-4DA6FD83C36B}">
+      <dsp:nvSpPr>
+        <dsp:cNvPr id="0" name=""/>
+        <dsp:cNvSpPr/>
+      </dsp:nvSpPr>
+      <dsp:spPr>
+        <a:xfrm>
+          <a:off x="5064707" y="3469636"/>
+          <a:ext cx="2839377" cy="865663"/>
+        </a:xfrm>
+        <a:prstGeom prst="rect">
+          <a:avLst/>
+        </a:prstGeom>
+        <a:gradFill rotWithShape="0">
+          <a:gsLst>
+            <a:gs pos="0">
+              <a:schemeClr val="accent5">
+                <a:hueOff val="0"/>
+                <a:satOff val="0"/>
+                <a:lumOff val="0"/>
+                <a:alphaOff val="0"/>
+                <a:satMod val="103000"/>
+                <a:lumMod val="102000"/>
+                <a:tint val="94000"/>
+              </a:schemeClr>
+            </a:gs>
+            <a:gs pos="50000">
+              <a:schemeClr val="accent5">
+                <a:hueOff val="0"/>
+                <a:satOff val="0"/>
+                <a:lumOff val="0"/>
+                <a:alphaOff val="0"/>
+                <a:satMod val="110000"/>
+                <a:lumMod val="100000"/>
+                <a:shade val="100000"/>
+              </a:schemeClr>
+            </a:gs>
+            <a:gs pos="100000">
+              <a:schemeClr val="accent5">
+                <a:hueOff val="0"/>
+                <a:satOff val="0"/>
+                <a:lumOff val="0"/>
+                <a:alphaOff val="0"/>
+                <a:lumMod val="99000"/>
+                <a:satMod val="120000"/>
+                <a:shade val="78000"/>
+              </a:schemeClr>
+            </a:gs>
+          </a:gsLst>
+          <a:lin ang="5400000" scaled="0"/>
+        </a:gradFill>
+        <a:ln>
+          <a:noFill/>
+        </a:ln>
+        <a:effectLst>
+          <a:outerShdw blurRad="57150" dist="19050" dir="5400000" algn="ctr" rotWithShape="0">
+            <a:srgbClr val="000000">
+              <a:alpha val="63000"/>
+            </a:srgbClr>
+          </a:outerShdw>
+        </a:effectLst>
+      </dsp:spPr>
+      <dsp:style>
+        <a:lnRef idx="0">
+          <a:scrgbClr r="0" g="0" b="0"/>
+        </a:lnRef>
+        <a:fillRef idx="3">
+          <a:scrgbClr r="0" g="0" b="0"/>
+        </a:fillRef>
+        <a:effectRef idx="3">
+          <a:scrgbClr r="0" g="0" b="0"/>
+        </a:effectRef>
+        <a:fontRef idx="minor">
+          <a:schemeClr val="lt1"/>
+        </a:fontRef>
+      </dsp:style>
+      <dsp:txBody>
+        <a:bodyPr spcFirstLastPara="0" vert="horz" wrap="square" lIns="12700" tIns="12700" rIns="12700" bIns="12700" numCol="1" spcCol="1270" anchor="ctr" anchorCtr="0">
+          <a:noAutofit/>
+        </a:bodyPr>
+        <a:lstStyle/>
+        <a:p>
+          <a:pPr marL="0" lvl="0" indent="0" algn="ctr" defTabSz="889000">
+            <a:lnSpc>
+              <a:spcPct val="90000"/>
+            </a:lnSpc>
+            <a:spcBef>
+              <a:spcPct val="0"/>
+            </a:spcBef>
+            <a:spcAft>
+              <a:spcPct val="35000"/>
+            </a:spcAft>
+            <a:buNone/>
+          </a:pPr>
+          <a:r>
+            <a:rPr lang="en-US" sz="2000" b="0" kern="1200" dirty="0" err="1">
+              <a:latin typeface="Arial" panose="020B0604020202020204" pitchFamily="34" charset="0"/>
+              <a:cs typeface="Arial" panose="020B0604020202020204" pitchFamily="34" charset="0"/>
             </a:rPr>
             <a:t>NationalInstruments</a:t>
           </a:r>
           <a:endParaRPr lang="en-US" sz="2000" b="0" kern="1200" dirty="0">
-            <a:latin typeface="Aharoni" panose="020B0604020202020204" pitchFamily="2" charset="-79"/>
-            <a:cs typeface="Aharoni" panose="020B0604020202020204" pitchFamily="2" charset="-79"/>
+            <a:latin typeface="Arial" panose="020B0604020202020204" pitchFamily="34" charset="0"/>
+            <a:cs typeface="Arial" panose="020B0604020202020204" pitchFamily="34" charset="0"/>
           </a:endParaRPr>
         </a:p>
       </dsp:txBody>
       <dsp:txXfrm>
-        <a:off x="5122820" y="2823825"/>
-        <a:ext cx="3004265" cy="915934"/>
+        <a:off x="5064707" y="3469636"/>
+        <a:ext cx="2839377" cy="865663"/>
       </dsp:txXfrm>
     </dsp:sp>
     <dsp:sp modelId="{8D515895-ACF2-4C34-9E6A-146C8645314E}">
@@ -2865,8 +3113,8 @@
       </dsp:nvSpPr>
       <dsp:spPr>
         <a:xfrm>
-          <a:off x="5122820" y="3968743"/>
-          <a:ext cx="3004265" cy="915934"/>
+          <a:off x="5064707" y="4551716"/>
+          <a:ext cx="2839377" cy="865663"/>
         </a:xfrm>
         <a:prstGeom prst="rect">
           <a:avLst/>
@@ -2954,124 +3202,16 @@
           </a:pPr>
           <a:r>
             <a:rPr lang="en-US" sz="2000" b="0" kern="1200" dirty="0">
-              <a:latin typeface="Aharoni" panose="020B0604020202020204" pitchFamily="2" charset="-79"/>
-              <a:cs typeface="Aharoni" panose="020B0604020202020204" pitchFamily="2" charset="-79"/>
+              <a:latin typeface="Arial" panose="020B0604020202020204" pitchFamily="34" charset="0"/>
+              <a:cs typeface="Arial" panose="020B0604020202020204" pitchFamily="34" charset="0"/>
             </a:rPr>
             <a:t>Some new system interface…</a:t>
           </a:r>
         </a:p>
       </dsp:txBody>
       <dsp:txXfrm>
-        <a:off x="5122820" y="3968743"/>
-        <a:ext cx="3004265" cy="915934"/>
-      </dsp:txXfrm>
-    </dsp:sp>
-    <dsp:sp modelId="{8BFE763E-1F61-43EB-86C6-6758D7B275C0}">
-      <dsp:nvSpPr>
-        <dsp:cNvPr id="0" name=""/>
-        <dsp:cNvSpPr/>
-      </dsp:nvSpPr>
-      <dsp:spPr>
-        <a:xfrm>
-          <a:off x="1517701" y="3396284"/>
-          <a:ext cx="3004265" cy="915934"/>
-        </a:xfrm>
-        <a:prstGeom prst="rect">
-          <a:avLst/>
-        </a:prstGeom>
-        <a:gradFill rotWithShape="0">
-          <a:gsLst>
-            <a:gs pos="0">
-              <a:schemeClr val="accent4">
-                <a:hueOff val="0"/>
-                <a:satOff val="0"/>
-                <a:lumOff val="0"/>
-                <a:alphaOff val="0"/>
-                <a:satMod val="103000"/>
-                <a:lumMod val="102000"/>
-                <a:tint val="94000"/>
-              </a:schemeClr>
-            </a:gs>
-            <a:gs pos="50000">
-              <a:schemeClr val="accent4">
-                <a:hueOff val="0"/>
-                <a:satOff val="0"/>
-                <a:lumOff val="0"/>
-                <a:alphaOff val="0"/>
-                <a:satMod val="110000"/>
-                <a:lumMod val="100000"/>
-                <a:shade val="100000"/>
-              </a:schemeClr>
-            </a:gs>
-            <a:gs pos="100000">
-              <a:schemeClr val="accent4">
-                <a:hueOff val="0"/>
-                <a:satOff val="0"/>
-                <a:lumOff val="0"/>
-                <a:alphaOff val="0"/>
-                <a:lumMod val="99000"/>
-                <a:satMod val="120000"/>
-                <a:shade val="78000"/>
-              </a:schemeClr>
-            </a:gs>
-          </a:gsLst>
-          <a:lin ang="5400000" scaled="0"/>
-        </a:gradFill>
-        <a:ln>
-          <a:noFill/>
-        </a:ln>
-        <a:effectLst>
-          <a:outerShdw blurRad="57150" dist="19050" dir="5400000" algn="ctr" rotWithShape="0">
-            <a:srgbClr val="000000">
-              <a:alpha val="63000"/>
-            </a:srgbClr>
-          </a:outerShdw>
-        </a:effectLst>
-      </dsp:spPr>
-      <dsp:style>
-        <a:lnRef idx="0">
-          <a:scrgbClr r="0" g="0" b="0"/>
-        </a:lnRef>
-        <a:fillRef idx="3">
-          <a:scrgbClr r="0" g="0" b="0"/>
-        </a:fillRef>
-        <a:effectRef idx="3">
-          <a:scrgbClr r="0" g="0" b="0"/>
-        </a:effectRef>
-        <a:fontRef idx="minor">
-          <a:schemeClr val="lt1"/>
-        </a:fontRef>
-      </dsp:style>
-      <dsp:txBody>
-        <a:bodyPr spcFirstLastPara="0" vert="horz" wrap="square" lIns="12700" tIns="12700" rIns="12700" bIns="12700" numCol="1" spcCol="1270" anchor="ctr" anchorCtr="0">
-          <a:noAutofit/>
-        </a:bodyPr>
-        <a:lstStyle/>
-        <a:p>
-          <a:pPr marL="0" lvl="0" indent="0" algn="ctr" defTabSz="889000">
-            <a:lnSpc>
-              <a:spcPct val="90000"/>
-            </a:lnSpc>
-            <a:spcBef>
-              <a:spcPct val="0"/>
-            </a:spcBef>
-            <a:spcAft>
-              <a:spcPct val="35000"/>
-            </a:spcAft>
-            <a:buNone/>
-          </a:pPr>
-          <a:r>
-            <a:rPr lang="en-US" sz="2000" b="0" kern="1200" dirty="0">
-              <a:latin typeface="Aharoni" panose="020B0604020202020204" pitchFamily="2" charset="-79"/>
-              <a:cs typeface="Aharoni" panose="020B0604020202020204" pitchFamily="2" charset="-79"/>
-            </a:rPr>
-            <a:t>Config</a:t>
-          </a:r>
-        </a:p>
-      </dsp:txBody>
-      <dsp:txXfrm>
-        <a:off x="1517701" y="3396284"/>
-        <a:ext cx="3004265" cy="915934"/>
+        <a:off x="5064707" y="4551716"/>
+        <a:ext cx="2839377" cy="865663"/>
       </dsp:txXfrm>
     </dsp:sp>
   </dsp:spTree>
@@ -7662,7 +7802,7 @@
           <p:nvPr>
             <p:extLst>
               <p:ext uri="{D42A27DB-BD31-4B8C-83A1-F6EECF244321}">
-                <p14:modId xmlns:p14="http://schemas.microsoft.com/office/powerpoint/2010/main" val="2645724648"/>
+                <p14:modId xmlns:p14="http://schemas.microsoft.com/office/powerpoint/2010/main" val="3297145875"/>
               </p:ext>
             </p:extLst>
           </p:nvPr>

</xml_diff>